<commit_message>
User Manual Getting there
</commit_message>
<xml_diff>
--- a/docsProject/IntentUserManualImages.pptx
+++ b/docsProject/IntentUserManualImages.pptx
@@ -5,10 +5,18 @@
     <p:sldMasterId id="2147483648" r:id="rId1"/>
   </p:sldMasterIdLst>
   <p:sldIdLst>
-    <p:sldId id="256" r:id="rId2"/>
-    <p:sldId id="257" r:id="rId3"/>
-    <p:sldId id="258" r:id="rId4"/>
-    <p:sldId id="259" r:id="rId5"/>
+    <p:sldId id="259" r:id="rId2"/>
+    <p:sldId id="256" r:id="rId3"/>
+    <p:sldId id="257" r:id="rId4"/>
+    <p:sldId id="258" r:id="rId5"/>
+    <p:sldId id="260" r:id="rId6"/>
+    <p:sldId id="261" r:id="rId7"/>
+    <p:sldId id="262" r:id="rId8"/>
+    <p:sldId id="263" r:id="rId9"/>
+    <p:sldId id="264" r:id="rId10"/>
+    <p:sldId id="265" r:id="rId11"/>
+    <p:sldId id="266" r:id="rId12"/>
+    <p:sldId id="267" r:id="rId13"/>
   </p:sldIdLst>
   <p:sldSz cx="12192000" cy="6858000"/>
   <p:notesSz cx="6858000" cy="9144000"/>
@@ -107,6 +115,11 @@
       </a:defRPr>
     </a:lvl9pPr>
   </p:defaultTextStyle>
+  <p:extLst>
+    <p:ext uri="{EFAFB233-063F-42B5-8137-9DF3F51BA10A}">
+      <p15:sldGuideLst xmlns:p15="http://schemas.microsoft.com/office/powerpoint/2012/main"/>
+    </p:ext>
+  </p:extLst>
 </p:presentation>
 </file>
 
@@ -241,7 +254,7 @@
           <a:p>
             <a:fld id="{1461CAAB-CD95-4EF5-8A41-73166CBFBDC9}" type="datetimeFigureOut">
               <a:rPr lang="en-US" smtClean="0"/>
-              <a:t>9/12/2017</a:t>
+              <a:t>9/15/2017</a:t>
             </a:fld>
             <a:endParaRPr lang="en-US"/>
           </a:p>
@@ -411,7 +424,7 @@
           <a:p>
             <a:fld id="{1461CAAB-CD95-4EF5-8A41-73166CBFBDC9}" type="datetimeFigureOut">
               <a:rPr lang="en-US" smtClean="0"/>
-              <a:t>9/12/2017</a:t>
+              <a:t>9/15/2017</a:t>
             </a:fld>
             <a:endParaRPr lang="en-US"/>
           </a:p>
@@ -591,7 +604,7 @@
           <a:p>
             <a:fld id="{1461CAAB-CD95-4EF5-8A41-73166CBFBDC9}" type="datetimeFigureOut">
               <a:rPr lang="en-US" smtClean="0"/>
-              <a:t>9/12/2017</a:t>
+              <a:t>9/15/2017</a:t>
             </a:fld>
             <a:endParaRPr lang="en-US"/>
           </a:p>
@@ -761,7 +774,7 @@
           <a:p>
             <a:fld id="{1461CAAB-CD95-4EF5-8A41-73166CBFBDC9}" type="datetimeFigureOut">
               <a:rPr lang="en-US" smtClean="0"/>
-              <a:t>9/12/2017</a:t>
+              <a:t>9/15/2017</a:t>
             </a:fld>
             <a:endParaRPr lang="en-US"/>
           </a:p>
@@ -1007,7 +1020,7 @@
           <a:p>
             <a:fld id="{1461CAAB-CD95-4EF5-8A41-73166CBFBDC9}" type="datetimeFigureOut">
               <a:rPr lang="en-US" smtClean="0"/>
-              <a:t>9/12/2017</a:t>
+              <a:t>9/15/2017</a:t>
             </a:fld>
             <a:endParaRPr lang="en-US"/>
           </a:p>
@@ -1239,7 +1252,7 @@
           <a:p>
             <a:fld id="{1461CAAB-CD95-4EF5-8A41-73166CBFBDC9}" type="datetimeFigureOut">
               <a:rPr lang="en-US" smtClean="0"/>
-              <a:t>9/12/2017</a:t>
+              <a:t>9/15/2017</a:t>
             </a:fld>
             <a:endParaRPr lang="en-US"/>
           </a:p>
@@ -1606,7 +1619,7 @@
           <a:p>
             <a:fld id="{1461CAAB-CD95-4EF5-8A41-73166CBFBDC9}" type="datetimeFigureOut">
               <a:rPr lang="en-US" smtClean="0"/>
-              <a:t>9/12/2017</a:t>
+              <a:t>9/15/2017</a:t>
             </a:fld>
             <a:endParaRPr lang="en-US"/>
           </a:p>
@@ -1724,7 +1737,7 @@
           <a:p>
             <a:fld id="{1461CAAB-CD95-4EF5-8A41-73166CBFBDC9}" type="datetimeFigureOut">
               <a:rPr lang="en-US" smtClean="0"/>
-              <a:t>9/12/2017</a:t>
+              <a:t>9/15/2017</a:t>
             </a:fld>
             <a:endParaRPr lang="en-US"/>
           </a:p>
@@ -1819,7 +1832,7 @@
           <a:p>
             <a:fld id="{1461CAAB-CD95-4EF5-8A41-73166CBFBDC9}" type="datetimeFigureOut">
               <a:rPr lang="en-US" smtClean="0"/>
-              <a:t>9/12/2017</a:t>
+              <a:t>9/15/2017</a:t>
             </a:fld>
             <a:endParaRPr lang="en-US"/>
           </a:p>
@@ -2096,7 +2109,7 @@
           <a:p>
             <a:fld id="{1461CAAB-CD95-4EF5-8A41-73166CBFBDC9}" type="datetimeFigureOut">
               <a:rPr lang="en-US" smtClean="0"/>
-              <a:t>9/12/2017</a:t>
+              <a:t>9/15/2017</a:t>
             </a:fld>
             <a:endParaRPr lang="en-US"/>
           </a:p>
@@ -2349,7 +2362,7 @@
           <a:p>
             <a:fld id="{1461CAAB-CD95-4EF5-8A41-73166CBFBDC9}" type="datetimeFigureOut">
               <a:rPr lang="en-US" smtClean="0"/>
-              <a:t>9/12/2017</a:t>
+              <a:t>9/15/2017</a:t>
             </a:fld>
             <a:endParaRPr lang="en-US"/>
           </a:p>
@@ -2562,7 +2575,7 @@
           <a:p>
             <a:fld id="{1461CAAB-CD95-4EF5-8A41-73166CBFBDC9}" type="datetimeFigureOut">
               <a:rPr lang="en-US" smtClean="0"/>
-              <a:t>9/12/2017</a:t>
+              <a:t>9/15/2017</a:t>
             </a:fld>
             <a:endParaRPr lang="en-US"/>
           </a:p>
@@ -2967,9 +2980,153 @@
           <a:chExt cx="0" cy="0"/>
         </a:xfrm>
       </p:grpSpPr>
+      <p:grpSp>
+        <p:nvGrpSpPr>
+          <p:cNvPr id="13" name="Group 12"/>
+          <p:cNvGrpSpPr/>
+          <p:nvPr/>
+        </p:nvGrpSpPr>
+        <p:grpSpPr>
+          <a:xfrm>
+            <a:off x="164756" y="119576"/>
+            <a:ext cx="114377" cy="111013"/>
+            <a:chOff x="164756" y="119576"/>
+            <a:chExt cx="114377" cy="111013"/>
+          </a:xfrm>
+        </p:grpSpPr>
+        <p:sp>
+          <p:nvSpPr>
+            <p:cNvPr id="8" name="Oval 7"/>
+            <p:cNvSpPr/>
+            <p:nvPr/>
+          </p:nvSpPr>
+          <p:spPr>
+            <a:xfrm>
+              <a:off x="164756" y="119576"/>
+              <a:ext cx="114377" cy="111013"/>
+            </a:xfrm>
+            <a:prstGeom prst="ellipse">
+              <a:avLst/>
+            </a:prstGeom>
+            <a:solidFill>
+              <a:srgbClr val="F5AB0C"/>
+            </a:solidFill>
+            <a:ln>
+              <a:solidFill>
+                <a:schemeClr val="tx1"/>
+              </a:solidFill>
+            </a:ln>
+          </p:spPr>
+          <p:style>
+            <a:lnRef idx="2">
+              <a:schemeClr val="accent1">
+                <a:shade val="50000"/>
+              </a:schemeClr>
+            </a:lnRef>
+            <a:fillRef idx="1">
+              <a:schemeClr val="accent1"/>
+            </a:fillRef>
+            <a:effectRef idx="0">
+              <a:schemeClr val="accent1"/>
+            </a:effectRef>
+            <a:fontRef idx="minor">
+              <a:schemeClr val="lt1"/>
+            </a:fontRef>
+          </p:style>
+          <p:txBody>
+            <a:bodyPr rtlCol="0" anchor="ctr"/>
+            <a:lstStyle/>
+            <a:p>
+              <a:pPr algn="ctr"/>
+              <a:endParaRPr lang="en-US" dirty="0">
+                <a:solidFill>
+                  <a:schemeClr val="tx1"/>
+                </a:solidFill>
+                <a:latin typeface="Franklin Gothic Demi Cond" panose="020B0706030402020204" pitchFamily="34" charset="0"/>
+              </a:endParaRPr>
+            </a:p>
+          </p:txBody>
+        </p:sp>
+        <p:sp>
+          <p:nvSpPr>
+            <p:cNvPr id="10" name="Right Arrow 9"/>
+            <p:cNvSpPr/>
+            <p:nvPr/>
+          </p:nvSpPr>
+          <p:spPr>
+            <a:xfrm>
+              <a:off x="187332" y="145614"/>
+              <a:ext cx="78751" cy="68034"/>
+            </a:xfrm>
+            <a:prstGeom prst="rightArrow">
+              <a:avLst/>
+            </a:prstGeom>
+            <a:solidFill>
+              <a:srgbClr val="5B6373"/>
+            </a:solidFill>
+            <a:ln>
+              <a:noFill/>
+            </a:ln>
+          </p:spPr>
+          <p:style>
+            <a:lnRef idx="2">
+              <a:schemeClr val="accent1">
+                <a:shade val="50000"/>
+              </a:schemeClr>
+            </a:lnRef>
+            <a:fillRef idx="1">
+              <a:schemeClr val="accent1"/>
+            </a:fillRef>
+            <a:effectRef idx="0">
+              <a:schemeClr val="accent1"/>
+            </a:effectRef>
+            <a:fontRef idx="minor">
+              <a:schemeClr val="lt1"/>
+            </a:fontRef>
+          </p:style>
+          <p:txBody>
+            <a:bodyPr rtlCol="0" anchor="ctr"/>
+            <a:lstStyle/>
+            <a:p>
+              <a:pPr algn="ctr"/>
+              <a:endParaRPr lang="en-US"/>
+            </a:p>
+          </p:txBody>
+        </p:sp>
+      </p:grpSp>
+    </p:spTree>
+    <p:extLst>
+      <p:ext uri="{BB962C8B-B14F-4D97-AF65-F5344CB8AC3E}">
+        <p14:creationId xmlns:p14="http://schemas.microsoft.com/office/powerpoint/2010/main" val="3372529483"/>
+      </p:ext>
+    </p:extLst>
+  </p:cSld>
+  <p:clrMapOvr>
+    <a:masterClrMapping/>
+  </p:clrMapOvr>
+</p:sld>
+</file>
+
+<file path=ppt/slides/slide10.xml><?xml version="1.0" encoding="utf-8"?>
+<p:sld xmlns:a="http://schemas.openxmlformats.org/drawingml/2006/main" xmlns:r="http://schemas.openxmlformats.org/officeDocument/2006/relationships" xmlns:p="http://schemas.openxmlformats.org/presentationml/2006/main">
+  <p:cSld>
+    <p:spTree>
+      <p:nvGrpSpPr>
+        <p:cNvPr id="1" name=""/>
+        <p:cNvGrpSpPr/>
+        <p:nvPr/>
+      </p:nvGrpSpPr>
+      <p:grpSpPr>
+        <a:xfrm>
+          <a:off x="0" y="0"/>
+          <a:ext cx="0" cy="0"/>
+          <a:chOff x="0" y="0"/>
+          <a:chExt cx="0" cy="0"/>
+        </a:xfrm>
+      </p:grpSpPr>
       <p:pic>
         <p:nvPicPr>
-          <p:cNvPr id="12" name="Picture 11"/>
+          <p:cNvPr id="2" name="Picture 1"/>
           <p:cNvPicPr>
             <a:picLocks noChangeAspect="1"/>
           </p:cNvPicPr>
@@ -2983,8 +3140,8 @@
         </p:blipFill>
         <p:spPr>
           <a:xfrm>
-            <a:off x="0" y="211223"/>
-            <a:ext cx="7610475" cy="3305175"/>
+            <a:off x="2252662" y="1014412"/>
+            <a:ext cx="7686675" cy="4829175"/>
           </a:xfrm>
           <a:prstGeom prst="rect">
             <a:avLst/>
@@ -2993,13 +3150,13 @@
       </p:pic>
       <p:sp>
         <p:nvSpPr>
-          <p:cNvPr id="5" name="Oval 4"/>
+          <p:cNvPr id="7" name="Oval 6"/>
           <p:cNvSpPr/>
           <p:nvPr/>
         </p:nvSpPr>
         <p:spPr>
           <a:xfrm>
-            <a:off x="1837037" y="403653"/>
+            <a:off x="4498630" y="1541126"/>
             <a:ext cx="280087" cy="271849"/>
           </a:xfrm>
           <a:prstGeom prst="ellipse">
@@ -3036,13 +3193,13 @@
           <a:p>
             <a:pPr algn="ctr"/>
             <a:r>
-              <a:rPr lang="en-US" dirty="0" smtClean="0">
+              <a:rPr lang="en-US" dirty="0">
                 <a:solidFill>
                   <a:schemeClr val="tx1"/>
                 </a:solidFill>
                 <a:latin typeface="Franklin Gothic Demi Cond" panose="020B0706030402020204" pitchFamily="34" charset="0"/>
               </a:rPr>
-              <a:t>1</a:t>
+              <a:t>2</a:t>
             </a:r>
             <a:endParaRPr lang="en-US" dirty="0">
               <a:solidFill>
@@ -3055,13 +3212,13 @@
       </p:sp>
       <p:sp>
         <p:nvSpPr>
-          <p:cNvPr id="6" name="Oval 5"/>
+          <p:cNvPr id="8" name="Oval 7"/>
           <p:cNvSpPr/>
           <p:nvPr/>
         </p:nvSpPr>
         <p:spPr>
           <a:xfrm>
-            <a:off x="2969741" y="403653"/>
+            <a:off x="8110921" y="1541126"/>
             <a:ext cx="280087" cy="271849"/>
           </a:xfrm>
           <a:prstGeom prst="ellipse">
@@ -3104,7 +3261,7 @@
                 </a:solidFill>
                 <a:latin typeface="Franklin Gothic Demi Cond" panose="020B0706030402020204" pitchFamily="34" charset="0"/>
               </a:rPr>
-              <a:t>2</a:t>
+              <a:t>3</a:t>
             </a:r>
             <a:endParaRPr lang="en-US" dirty="0">
               <a:solidFill>
@@ -3117,13 +3274,13 @@
       </p:sp>
       <p:sp>
         <p:nvSpPr>
-          <p:cNvPr id="7" name="Oval 6"/>
+          <p:cNvPr id="9" name="Oval 8"/>
           <p:cNvSpPr/>
           <p:nvPr/>
         </p:nvSpPr>
         <p:spPr>
           <a:xfrm>
-            <a:off x="5371070" y="403653"/>
+            <a:off x="5522435" y="1924321"/>
             <a:ext cx="280087" cy="271849"/>
           </a:xfrm>
           <a:prstGeom prst="ellipse">
@@ -3166,7 +3323,7 @@
                 </a:solidFill>
                 <a:latin typeface="Franklin Gothic Demi Cond" panose="020B0706030402020204" pitchFamily="34" charset="0"/>
               </a:rPr>
-              <a:t>3</a:t>
+              <a:t>4</a:t>
             </a:r>
             <a:endParaRPr lang="en-US" dirty="0">
               <a:solidFill>
@@ -3179,13 +3336,13 @@
       </p:sp>
       <p:sp>
         <p:nvSpPr>
-          <p:cNvPr id="8" name="Oval 7"/>
+          <p:cNvPr id="10" name="Oval 9"/>
           <p:cNvSpPr/>
           <p:nvPr/>
         </p:nvSpPr>
         <p:spPr>
           <a:xfrm>
-            <a:off x="5836508" y="403653"/>
+            <a:off x="3550241" y="5231411"/>
             <a:ext cx="280087" cy="271849"/>
           </a:xfrm>
           <a:prstGeom prst="ellipse">
@@ -3222,13 +3379,13 @@
           <a:p>
             <a:pPr algn="ctr"/>
             <a:r>
-              <a:rPr lang="en-US" dirty="0" smtClean="0">
+              <a:rPr lang="en-US" dirty="0">
                 <a:solidFill>
                   <a:schemeClr val="tx1"/>
                 </a:solidFill>
                 <a:latin typeface="Franklin Gothic Demi Cond" panose="020B0706030402020204" pitchFamily="34" charset="0"/>
               </a:rPr>
-              <a:t>4</a:t>
+              <a:t>7</a:t>
             </a:r>
             <a:endParaRPr lang="en-US" dirty="0">
               <a:solidFill>
@@ -3241,13 +3398,13 @@
       </p:sp>
       <p:sp>
         <p:nvSpPr>
-          <p:cNvPr id="9" name="Oval 8"/>
+          <p:cNvPr id="11" name="Oval 10"/>
           <p:cNvSpPr/>
           <p:nvPr/>
         </p:nvSpPr>
         <p:spPr>
           <a:xfrm>
-            <a:off x="7125730" y="403653"/>
+            <a:off x="4621033" y="1009650"/>
             <a:ext cx="280087" cy="271849"/>
           </a:xfrm>
           <a:prstGeom prst="ellipse">
@@ -3284,6 +3441,118 @@
           <a:p>
             <a:pPr algn="ctr"/>
             <a:r>
+              <a:rPr lang="en-US" dirty="0">
+                <a:solidFill>
+                  <a:schemeClr val="tx1"/>
+                </a:solidFill>
+                <a:latin typeface="Franklin Gothic Demi Cond" panose="020B0706030402020204" pitchFamily="34" charset="0"/>
+              </a:rPr>
+              <a:t>1</a:t>
+            </a:r>
+          </a:p>
+        </p:txBody>
+      </p:sp>
+      <p:sp>
+        <p:nvSpPr>
+          <p:cNvPr id="12" name="Oval 11"/>
+          <p:cNvSpPr/>
+          <p:nvPr/>
+        </p:nvSpPr>
+        <p:spPr>
+          <a:xfrm>
+            <a:off x="4358586" y="5231410"/>
+            <a:ext cx="280087" cy="271849"/>
+          </a:xfrm>
+          <a:prstGeom prst="ellipse">
+            <a:avLst/>
+          </a:prstGeom>
+          <a:solidFill>
+            <a:srgbClr val="F5AB0C"/>
+          </a:solidFill>
+          <a:ln>
+            <a:solidFill>
+              <a:schemeClr val="tx1"/>
+            </a:solidFill>
+          </a:ln>
+        </p:spPr>
+        <p:style>
+          <a:lnRef idx="2">
+            <a:schemeClr val="accent1">
+              <a:shade val="50000"/>
+            </a:schemeClr>
+          </a:lnRef>
+          <a:fillRef idx="1">
+            <a:schemeClr val="accent1"/>
+          </a:fillRef>
+          <a:effectRef idx="0">
+            <a:schemeClr val="accent1"/>
+          </a:effectRef>
+          <a:fontRef idx="minor">
+            <a:schemeClr val="lt1"/>
+          </a:fontRef>
+        </p:style>
+        <p:txBody>
+          <a:bodyPr rtlCol="0" anchor="ctr"/>
+          <a:lstStyle/>
+          <a:p>
+            <a:pPr algn="ctr"/>
+            <a:r>
+              <a:rPr lang="en-US" dirty="0">
+                <a:solidFill>
+                  <a:schemeClr val="tx1"/>
+                </a:solidFill>
+                <a:latin typeface="Franklin Gothic Demi Cond" panose="020B0706030402020204" pitchFamily="34" charset="0"/>
+              </a:rPr>
+              <a:t>8</a:t>
+            </a:r>
+          </a:p>
+        </p:txBody>
+      </p:sp>
+      <p:sp>
+        <p:nvSpPr>
+          <p:cNvPr id="13" name="Oval 12"/>
+          <p:cNvSpPr/>
+          <p:nvPr/>
+        </p:nvSpPr>
+        <p:spPr>
+          <a:xfrm>
+            <a:off x="9468744" y="2009223"/>
+            <a:ext cx="280087" cy="271849"/>
+          </a:xfrm>
+          <a:prstGeom prst="ellipse">
+            <a:avLst/>
+          </a:prstGeom>
+          <a:solidFill>
+            <a:srgbClr val="F5AB0C"/>
+          </a:solidFill>
+          <a:ln>
+            <a:solidFill>
+              <a:schemeClr val="tx1"/>
+            </a:solidFill>
+          </a:ln>
+        </p:spPr>
+        <p:style>
+          <a:lnRef idx="2">
+            <a:schemeClr val="accent1">
+              <a:shade val="50000"/>
+            </a:schemeClr>
+          </a:lnRef>
+          <a:fillRef idx="1">
+            <a:schemeClr val="accent1"/>
+          </a:fillRef>
+          <a:effectRef idx="0">
+            <a:schemeClr val="accent1"/>
+          </a:effectRef>
+          <a:fontRef idx="minor">
+            <a:schemeClr val="lt1"/>
+          </a:fontRef>
+        </p:style>
+        <p:txBody>
+          <a:bodyPr rtlCol="0" anchor="ctr"/>
+          <a:lstStyle/>
+          <a:p>
+            <a:pPr algn="ctr"/>
+            <a:r>
               <a:rPr lang="en-US" dirty="0" smtClean="0">
                 <a:solidFill>
                   <a:schemeClr val="tx1"/>
@@ -3303,13 +3572,13 @@
       </p:sp>
       <p:sp>
         <p:nvSpPr>
-          <p:cNvPr id="10" name="Oval 9"/>
+          <p:cNvPr id="14" name="Oval 13"/>
           <p:cNvSpPr/>
           <p:nvPr/>
         </p:nvSpPr>
         <p:spPr>
           <a:xfrm>
-            <a:off x="1392192" y="1363489"/>
+            <a:off x="6272078" y="2145147"/>
             <a:ext cx="280087" cy="271849"/>
           </a:xfrm>
           <a:prstGeom prst="ellipse">
@@ -3346,7 +3615,7 @@
           <a:p>
             <a:pPr algn="ctr"/>
             <a:r>
-              <a:rPr lang="en-US" dirty="0" smtClean="0">
+              <a:rPr lang="en-US" dirty="0">
                 <a:solidFill>
                   <a:schemeClr val="tx1"/>
                 </a:solidFill>
@@ -3363,15 +3632,69 @@
           </a:p>
         </p:txBody>
       </p:sp>
-      <p:sp>
-        <p:nvSpPr>
-          <p:cNvPr id="11" name="Oval 10"/>
+    </p:spTree>
+    <p:extLst>
+      <p:ext uri="{BB962C8B-B14F-4D97-AF65-F5344CB8AC3E}">
+        <p14:creationId xmlns:p14="http://schemas.microsoft.com/office/powerpoint/2010/main" val="2060234540"/>
+      </p:ext>
+    </p:extLst>
+  </p:cSld>
+  <p:clrMapOvr>
+    <a:masterClrMapping/>
+  </p:clrMapOvr>
+</p:sld>
+</file>
+
+<file path=ppt/slides/slide11.xml><?xml version="1.0" encoding="utf-8"?>
+<p:sld xmlns:a="http://schemas.openxmlformats.org/drawingml/2006/main" xmlns:r="http://schemas.openxmlformats.org/officeDocument/2006/relationships" xmlns:p="http://schemas.openxmlformats.org/presentationml/2006/main">
+  <p:cSld>
+    <p:spTree>
+      <p:nvGrpSpPr>
+        <p:cNvPr id="1" name=""/>
+        <p:cNvGrpSpPr/>
+        <p:nvPr/>
+      </p:nvGrpSpPr>
+      <p:grpSpPr>
+        <a:xfrm>
+          <a:off x="0" y="0"/>
+          <a:ext cx="0" cy="0"/>
+          <a:chOff x="0" y="0"/>
+          <a:chExt cx="0" cy="0"/>
+        </a:xfrm>
+      </p:grpSpPr>
+      <p:pic>
+        <p:nvPicPr>
+          <p:cNvPr id="2" name="Picture 1"/>
+          <p:cNvPicPr>
+            <a:picLocks noChangeAspect="1"/>
+          </p:cNvPicPr>
+          <p:nvPr/>
+        </p:nvPicPr>
+        <p:blipFill>
+          <a:blip r:embed="rId2"/>
+          <a:stretch>
+            <a:fillRect/>
+          </a:stretch>
+        </p:blipFill>
+        <p:spPr>
+          <a:xfrm>
+            <a:off x="2352675" y="1790700"/>
+            <a:ext cx="7486650" cy="3276600"/>
+          </a:xfrm>
+          <a:prstGeom prst="rect">
+            <a:avLst/>
+          </a:prstGeom>
+        </p:spPr>
+      </p:pic>
+      <p:sp>
+        <p:nvSpPr>
+          <p:cNvPr id="3" name="Oval 2"/>
           <p:cNvSpPr/>
           <p:nvPr/>
         </p:nvSpPr>
         <p:spPr>
           <a:xfrm>
-            <a:off x="6903308" y="1363490"/>
+            <a:off x="5991991" y="3108374"/>
             <a:ext cx="280087" cy="271849"/>
           </a:xfrm>
           <a:prstGeom prst="ellipse">
@@ -3408,13 +3731,255 @@
           <a:p>
             <a:pPr algn="ctr"/>
             <a:r>
+              <a:rPr lang="en-US" dirty="0">
+                <a:solidFill>
+                  <a:schemeClr val="tx1"/>
+                </a:solidFill>
+                <a:latin typeface="Franklin Gothic Demi Cond" panose="020B0706030402020204" pitchFamily="34" charset="0"/>
+              </a:rPr>
+              <a:t>2</a:t>
+            </a:r>
+            <a:endParaRPr lang="en-US" dirty="0">
+              <a:solidFill>
+                <a:schemeClr val="tx1"/>
+              </a:solidFill>
+              <a:latin typeface="Franklin Gothic Demi Cond" panose="020B0706030402020204" pitchFamily="34" charset="0"/>
+            </a:endParaRPr>
+          </a:p>
+        </p:txBody>
+      </p:sp>
+      <p:sp>
+        <p:nvSpPr>
+          <p:cNvPr id="4" name="Oval 3"/>
+          <p:cNvSpPr/>
+          <p:nvPr/>
+        </p:nvSpPr>
+        <p:spPr>
+          <a:xfrm>
+            <a:off x="6272077" y="3334374"/>
+            <a:ext cx="280087" cy="271849"/>
+          </a:xfrm>
+          <a:prstGeom prst="ellipse">
+            <a:avLst/>
+          </a:prstGeom>
+          <a:solidFill>
+            <a:srgbClr val="F5AB0C"/>
+          </a:solidFill>
+          <a:ln>
+            <a:solidFill>
+              <a:schemeClr val="tx1"/>
+            </a:solidFill>
+          </a:ln>
+        </p:spPr>
+        <p:style>
+          <a:lnRef idx="2">
+            <a:schemeClr val="accent1">
+              <a:shade val="50000"/>
+            </a:schemeClr>
+          </a:lnRef>
+          <a:fillRef idx="1">
+            <a:schemeClr val="accent1"/>
+          </a:fillRef>
+          <a:effectRef idx="0">
+            <a:schemeClr val="accent1"/>
+          </a:effectRef>
+          <a:fontRef idx="minor">
+            <a:schemeClr val="lt1"/>
+          </a:fontRef>
+        </p:style>
+        <p:txBody>
+          <a:bodyPr rtlCol="0" anchor="ctr"/>
+          <a:lstStyle/>
+          <a:p>
+            <a:pPr algn="ctr"/>
+            <a:r>
+              <a:rPr lang="en-US" dirty="0">
+                <a:solidFill>
+                  <a:schemeClr val="tx1"/>
+                </a:solidFill>
+                <a:latin typeface="Franklin Gothic Demi Cond" panose="020B0706030402020204" pitchFamily="34" charset="0"/>
+              </a:rPr>
+              <a:t>3</a:t>
+            </a:r>
+            <a:endParaRPr lang="en-US" dirty="0">
+              <a:solidFill>
+                <a:schemeClr val="tx1"/>
+              </a:solidFill>
+              <a:latin typeface="Franklin Gothic Demi Cond" panose="020B0706030402020204" pitchFamily="34" charset="0"/>
+            </a:endParaRPr>
+          </a:p>
+        </p:txBody>
+      </p:sp>
+      <p:sp>
+        <p:nvSpPr>
+          <p:cNvPr id="5" name="Oval 4"/>
+          <p:cNvSpPr/>
+          <p:nvPr/>
+        </p:nvSpPr>
+        <p:spPr>
+          <a:xfrm>
+            <a:off x="6774587" y="3720170"/>
+            <a:ext cx="280087" cy="271849"/>
+          </a:xfrm>
+          <a:prstGeom prst="ellipse">
+            <a:avLst/>
+          </a:prstGeom>
+          <a:solidFill>
+            <a:srgbClr val="F5AB0C"/>
+          </a:solidFill>
+          <a:ln>
+            <a:solidFill>
+              <a:schemeClr val="tx1"/>
+            </a:solidFill>
+          </a:ln>
+        </p:spPr>
+        <p:style>
+          <a:lnRef idx="2">
+            <a:schemeClr val="accent1">
+              <a:shade val="50000"/>
+            </a:schemeClr>
+          </a:lnRef>
+          <a:fillRef idx="1">
+            <a:schemeClr val="accent1"/>
+          </a:fillRef>
+          <a:effectRef idx="0">
+            <a:schemeClr val="accent1"/>
+          </a:effectRef>
+          <a:fontRef idx="minor">
+            <a:schemeClr val="lt1"/>
+          </a:fontRef>
+        </p:style>
+        <p:txBody>
+          <a:bodyPr rtlCol="0" anchor="ctr"/>
+          <a:lstStyle/>
+          <a:p>
+            <a:pPr algn="ctr"/>
+            <a:r>
+              <a:rPr lang="en-US" dirty="0">
+                <a:solidFill>
+                  <a:schemeClr val="tx1"/>
+                </a:solidFill>
+                <a:latin typeface="Franklin Gothic Demi Cond" panose="020B0706030402020204" pitchFamily="34" charset="0"/>
+              </a:rPr>
+              <a:t>4</a:t>
+            </a:r>
+            <a:endParaRPr lang="en-US" dirty="0">
+              <a:solidFill>
+                <a:schemeClr val="tx1"/>
+              </a:solidFill>
+              <a:latin typeface="Franklin Gothic Demi Cond" panose="020B0706030402020204" pitchFamily="34" charset="0"/>
+            </a:endParaRPr>
+          </a:p>
+        </p:txBody>
+      </p:sp>
+      <p:sp>
+        <p:nvSpPr>
+          <p:cNvPr id="6" name="Oval 5"/>
+          <p:cNvSpPr/>
+          <p:nvPr/>
+        </p:nvSpPr>
+        <p:spPr>
+          <a:xfrm>
+            <a:off x="4778717" y="2484223"/>
+            <a:ext cx="280087" cy="271849"/>
+          </a:xfrm>
+          <a:prstGeom prst="ellipse">
+            <a:avLst/>
+          </a:prstGeom>
+          <a:solidFill>
+            <a:srgbClr val="F5AB0C"/>
+          </a:solidFill>
+          <a:ln>
+            <a:solidFill>
+              <a:schemeClr val="tx1"/>
+            </a:solidFill>
+          </a:ln>
+        </p:spPr>
+        <p:style>
+          <a:lnRef idx="2">
+            <a:schemeClr val="accent1">
+              <a:shade val="50000"/>
+            </a:schemeClr>
+          </a:lnRef>
+          <a:fillRef idx="1">
+            <a:schemeClr val="accent1"/>
+          </a:fillRef>
+          <a:effectRef idx="0">
+            <a:schemeClr val="accent1"/>
+          </a:effectRef>
+          <a:fontRef idx="minor">
+            <a:schemeClr val="lt1"/>
+          </a:fontRef>
+        </p:style>
+        <p:txBody>
+          <a:bodyPr rtlCol="0" anchor="ctr"/>
+          <a:lstStyle/>
+          <a:p>
+            <a:pPr algn="ctr"/>
+            <a:r>
+              <a:rPr lang="en-US" dirty="0">
+                <a:solidFill>
+                  <a:schemeClr val="tx1"/>
+                </a:solidFill>
+                <a:latin typeface="Franklin Gothic Demi Cond" panose="020B0706030402020204" pitchFamily="34" charset="0"/>
+              </a:rPr>
+              <a:t>1</a:t>
+            </a:r>
+          </a:p>
+        </p:txBody>
+      </p:sp>
+      <p:sp>
+        <p:nvSpPr>
+          <p:cNvPr id="7" name="Oval 6"/>
+          <p:cNvSpPr/>
+          <p:nvPr/>
+        </p:nvSpPr>
+        <p:spPr>
+          <a:xfrm>
+            <a:off x="9476982" y="2898909"/>
+            <a:ext cx="280087" cy="271849"/>
+          </a:xfrm>
+          <a:prstGeom prst="ellipse">
+            <a:avLst/>
+          </a:prstGeom>
+          <a:solidFill>
+            <a:srgbClr val="F5AB0C"/>
+          </a:solidFill>
+          <a:ln>
+            <a:solidFill>
+              <a:schemeClr val="tx1"/>
+            </a:solidFill>
+          </a:ln>
+        </p:spPr>
+        <p:style>
+          <a:lnRef idx="2">
+            <a:schemeClr val="accent1">
+              <a:shade val="50000"/>
+            </a:schemeClr>
+          </a:lnRef>
+          <a:fillRef idx="1">
+            <a:schemeClr val="accent1"/>
+          </a:fillRef>
+          <a:effectRef idx="0">
+            <a:schemeClr val="accent1"/>
+          </a:effectRef>
+          <a:fontRef idx="minor">
+            <a:schemeClr val="lt1"/>
+          </a:fontRef>
+        </p:style>
+        <p:txBody>
+          <a:bodyPr rtlCol="0" anchor="ctr"/>
+          <a:lstStyle/>
+          <a:p>
+            <a:pPr algn="ctr"/>
+            <a:r>
               <a:rPr lang="en-US" dirty="0" smtClean="0">
                 <a:solidFill>
                   <a:schemeClr val="tx1"/>
                 </a:solidFill>
                 <a:latin typeface="Franklin Gothic Demi Cond" panose="020B0706030402020204" pitchFamily="34" charset="0"/>
               </a:rPr>
-              <a:t>7</a:t>
+              <a:t>5</a:t>
             </a:r>
             <a:endParaRPr lang="en-US" dirty="0">
               <a:solidFill>
@@ -3428,7 +3993,37 @@
     </p:spTree>
     <p:extLst>
       <p:ext uri="{BB962C8B-B14F-4D97-AF65-F5344CB8AC3E}">
-        <p14:creationId xmlns:p14="http://schemas.microsoft.com/office/powerpoint/2010/main" val="4159065185"/>
+        <p14:creationId xmlns:p14="http://schemas.microsoft.com/office/powerpoint/2010/main" val="2407238136"/>
+      </p:ext>
+    </p:extLst>
+  </p:cSld>
+  <p:clrMapOvr>
+    <a:masterClrMapping/>
+  </p:clrMapOvr>
+</p:sld>
+</file>
+
+<file path=ppt/slides/slide12.xml><?xml version="1.0" encoding="utf-8"?>
+<p:sld xmlns:a="http://schemas.openxmlformats.org/drawingml/2006/main" xmlns:r="http://schemas.openxmlformats.org/officeDocument/2006/relationships" xmlns:p="http://schemas.openxmlformats.org/presentationml/2006/main">
+  <p:cSld>
+    <p:spTree>
+      <p:nvGrpSpPr>
+        <p:cNvPr id="1" name=""/>
+        <p:cNvGrpSpPr/>
+        <p:nvPr/>
+      </p:nvGrpSpPr>
+      <p:grpSpPr>
+        <a:xfrm>
+          <a:off x="0" y="0"/>
+          <a:ext cx="0" cy="0"/>
+          <a:chOff x="0" y="0"/>
+          <a:chExt cx="0" cy="0"/>
+        </a:xfrm>
+      </p:grpSpPr>
+    </p:spTree>
+    <p:extLst>
+      <p:ext uri="{BB962C8B-B14F-4D97-AF65-F5344CB8AC3E}">
+        <p14:creationId xmlns:p14="http://schemas.microsoft.com/office/powerpoint/2010/main" val="1373194802"/>
       </p:ext>
     </p:extLst>
   </p:cSld>
@@ -3457,7 +4052,7 @@
       </p:grpSpPr>
       <p:pic>
         <p:nvPicPr>
-          <p:cNvPr id="4" name="Picture 3"/>
+          <p:cNvPr id="12" name="Picture 11"/>
           <p:cNvPicPr>
             <a:picLocks noChangeAspect="1"/>
           </p:cNvPicPr>
@@ -3471,8 +4066,8 @@
         </p:blipFill>
         <p:spPr>
           <a:xfrm>
-            <a:off x="357831" y="274808"/>
-            <a:ext cx="9334500" cy="3705225"/>
+            <a:off x="0" y="211223"/>
+            <a:ext cx="7610475" cy="3305175"/>
           </a:xfrm>
           <a:prstGeom prst="rect">
             <a:avLst/>
@@ -3487,7 +4082,7 @@
         </p:nvSpPr>
         <p:spPr>
           <a:xfrm>
-            <a:off x="1853512" y="1338774"/>
+            <a:off x="1837037" y="403653"/>
             <a:ext cx="280087" cy="271849"/>
           </a:xfrm>
           <a:prstGeom prst="ellipse">
@@ -3549,7 +4144,7 @@
         </p:nvSpPr>
         <p:spPr>
           <a:xfrm>
-            <a:off x="2133599" y="1610623"/>
+            <a:off x="2969741" y="403653"/>
             <a:ext cx="280087" cy="271849"/>
           </a:xfrm>
           <a:prstGeom prst="ellipse">
@@ -3594,12 +4189,6 @@
               </a:rPr>
               <a:t>2</a:t>
             </a:r>
-            <a:endParaRPr lang="en-US" dirty="0">
-              <a:solidFill>
-                <a:schemeClr val="tx1"/>
-              </a:solidFill>
-              <a:latin typeface="Franklin Gothic Demi Cond" panose="020B0706030402020204" pitchFamily="34" charset="0"/>
-            </a:endParaRPr>
           </a:p>
         </p:txBody>
       </p:sp>
@@ -3611,7 +4200,7 @@
         </p:nvSpPr>
         <p:spPr>
           <a:xfrm>
-            <a:off x="1342763" y="2103609"/>
+            <a:off x="5371070" y="403653"/>
             <a:ext cx="280087" cy="271849"/>
           </a:xfrm>
           <a:prstGeom prst="ellipse">
@@ -3656,12 +4245,6 @@
               </a:rPr>
               <a:t>3</a:t>
             </a:r>
-            <a:endParaRPr lang="en-US" dirty="0">
-              <a:solidFill>
-                <a:schemeClr val="tx1"/>
-              </a:solidFill>
-              <a:latin typeface="Franklin Gothic Demi Cond" panose="020B0706030402020204" pitchFamily="34" charset="0"/>
-            </a:endParaRPr>
           </a:p>
         </p:txBody>
       </p:sp>
@@ -3673,7 +4256,7 @@
         </p:nvSpPr>
         <p:spPr>
           <a:xfrm>
-            <a:off x="1713468" y="2342309"/>
+            <a:off x="5836508" y="403653"/>
             <a:ext cx="280087" cy="271849"/>
           </a:xfrm>
           <a:prstGeom prst="ellipse">
@@ -3735,7 +4318,7 @@
         </p:nvSpPr>
         <p:spPr>
           <a:xfrm>
-            <a:off x="2133598" y="2478234"/>
+            <a:off x="7125730" y="403653"/>
             <a:ext cx="280087" cy="271849"/>
           </a:xfrm>
           <a:prstGeom prst="ellipse">
@@ -3797,7 +4380,7 @@
         </p:nvSpPr>
         <p:spPr>
           <a:xfrm>
-            <a:off x="9053381" y="1095888"/>
+            <a:off x="1392192" y="1363489"/>
             <a:ext cx="280087" cy="271849"/>
           </a:xfrm>
           <a:prstGeom prst="ellipse">
@@ -3834,13 +4417,13 @@
           <a:p>
             <a:pPr algn="ctr"/>
             <a:r>
-              <a:rPr lang="en-US" dirty="0">
+              <a:rPr lang="en-US" dirty="0" smtClean="0">
                 <a:solidFill>
                   <a:schemeClr val="tx1"/>
                 </a:solidFill>
                 <a:latin typeface="Franklin Gothic Demi Cond" panose="020B0706030402020204" pitchFamily="34" charset="0"/>
               </a:rPr>
-              <a:t>7</a:t>
+              <a:t>6</a:t>
             </a:r>
             <a:endParaRPr lang="en-US" dirty="0">
               <a:solidFill>
@@ -3853,13 +4436,13 @@
       </p:sp>
       <p:sp>
         <p:nvSpPr>
-          <p:cNvPr id="13" name="Oval 12"/>
+          <p:cNvPr id="11" name="Oval 10"/>
           <p:cNvSpPr/>
           <p:nvPr/>
         </p:nvSpPr>
         <p:spPr>
           <a:xfrm>
-            <a:off x="1392189" y="2905896"/>
+            <a:off x="6903308" y="1363490"/>
             <a:ext cx="280087" cy="271849"/>
           </a:xfrm>
           <a:prstGeom prst="ellipse">
@@ -3902,7 +4485,7 @@
                 </a:solidFill>
                 <a:latin typeface="Franklin Gothic Demi Cond" panose="020B0706030402020204" pitchFamily="34" charset="0"/>
               </a:rPr>
-              <a:t>6</a:t>
+              <a:t>7</a:t>
             </a:r>
             <a:endParaRPr lang="en-US" dirty="0">
               <a:solidFill>
@@ -3916,7 +4499,7 @@
     </p:spTree>
     <p:extLst>
       <p:ext uri="{BB962C8B-B14F-4D97-AF65-F5344CB8AC3E}">
-        <p14:creationId xmlns:p14="http://schemas.microsoft.com/office/powerpoint/2010/main" val="1176905387"/>
+        <p14:creationId xmlns:p14="http://schemas.microsoft.com/office/powerpoint/2010/main" val="4159065185"/>
       </p:ext>
     </p:extLst>
   </p:cSld>
@@ -3959,8 +4542,8 @@
         </p:blipFill>
         <p:spPr>
           <a:xfrm>
-            <a:off x="228986" y="210708"/>
-            <a:ext cx="8010525" cy="5019675"/>
+            <a:off x="357831" y="274808"/>
+            <a:ext cx="9334500" cy="3705225"/>
           </a:xfrm>
           <a:prstGeom prst="rect">
             <a:avLst/>
@@ -3975,7 +4558,7 @@
         </p:nvSpPr>
         <p:spPr>
           <a:xfrm>
-            <a:off x="7158679" y="1231812"/>
+            <a:off x="1853512" y="1338774"/>
             <a:ext cx="280087" cy="271849"/>
           </a:xfrm>
           <a:prstGeom prst="ellipse">
@@ -4037,7 +4620,7 @@
         </p:nvSpPr>
         <p:spPr>
           <a:xfrm>
-            <a:off x="2413685" y="3177745"/>
+            <a:off x="2133599" y="1610623"/>
             <a:ext cx="280087" cy="271849"/>
           </a:xfrm>
           <a:prstGeom prst="ellipse">
@@ -4082,12 +4665,6 @@
               </a:rPr>
               <a:t>2</a:t>
             </a:r>
-            <a:endParaRPr lang="en-US" dirty="0">
-              <a:solidFill>
-                <a:schemeClr val="tx1"/>
-              </a:solidFill>
-              <a:latin typeface="Franklin Gothic Demi Cond" panose="020B0706030402020204" pitchFamily="34" charset="0"/>
-            </a:endParaRPr>
           </a:p>
         </p:txBody>
       </p:sp>
@@ -4099,7 +4676,7 @@
         </p:nvSpPr>
         <p:spPr>
           <a:xfrm>
-            <a:off x="4329810" y="2905895"/>
+            <a:off x="1342763" y="2103609"/>
             <a:ext cx="280087" cy="271849"/>
           </a:xfrm>
           <a:prstGeom prst="ellipse">
@@ -4144,12 +4721,6 @@
               </a:rPr>
               <a:t>3</a:t>
             </a:r>
-            <a:endParaRPr lang="en-US" dirty="0">
-              <a:solidFill>
-                <a:schemeClr val="tx1"/>
-              </a:solidFill>
-              <a:latin typeface="Franklin Gothic Demi Cond" panose="020B0706030402020204" pitchFamily="34" charset="0"/>
-            </a:endParaRPr>
           </a:p>
         </p:txBody>
       </p:sp>
@@ -4161,7 +4732,7 @@
         </p:nvSpPr>
         <p:spPr>
           <a:xfrm>
-            <a:off x="4932786" y="2905895"/>
+            <a:off x="1713468" y="2342309"/>
             <a:ext cx="280087" cy="271849"/>
           </a:xfrm>
           <a:prstGeom prst="ellipse">
@@ -4215,10 +4786,190 @@
           </a:p>
         </p:txBody>
       </p:sp>
+      <p:sp>
+        <p:nvSpPr>
+          <p:cNvPr id="9" name="Oval 8"/>
+          <p:cNvSpPr/>
+          <p:nvPr/>
+        </p:nvSpPr>
+        <p:spPr>
+          <a:xfrm>
+            <a:off x="2133598" y="2478234"/>
+            <a:ext cx="280087" cy="271849"/>
+          </a:xfrm>
+          <a:prstGeom prst="ellipse">
+            <a:avLst/>
+          </a:prstGeom>
+          <a:solidFill>
+            <a:srgbClr val="F5AB0C"/>
+          </a:solidFill>
+          <a:ln>
+            <a:solidFill>
+              <a:schemeClr val="tx1"/>
+            </a:solidFill>
+          </a:ln>
+        </p:spPr>
+        <p:style>
+          <a:lnRef idx="2">
+            <a:schemeClr val="accent1">
+              <a:shade val="50000"/>
+            </a:schemeClr>
+          </a:lnRef>
+          <a:fillRef idx="1">
+            <a:schemeClr val="accent1"/>
+          </a:fillRef>
+          <a:effectRef idx="0">
+            <a:schemeClr val="accent1"/>
+          </a:effectRef>
+          <a:fontRef idx="minor">
+            <a:schemeClr val="lt1"/>
+          </a:fontRef>
+        </p:style>
+        <p:txBody>
+          <a:bodyPr rtlCol="0" anchor="ctr"/>
+          <a:lstStyle/>
+          <a:p>
+            <a:pPr algn="ctr"/>
+            <a:r>
+              <a:rPr lang="en-US" dirty="0" smtClean="0">
+                <a:solidFill>
+                  <a:schemeClr val="tx1"/>
+                </a:solidFill>
+                <a:latin typeface="Franklin Gothic Demi Cond" panose="020B0706030402020204" pitchFamily="34" charset="0"/>
+              </a:rPr>
+              <a:t>5</a:t>
+            </a:r>
+            <a:endParaRPr lang="en-US" dirty="0">
+              <a:solidFill>
+                <a:schemeClr val="tx1"/>
+              </a:solidFill>
+              <a:latin typeface="Franklin Gothic Demi Cond" panose="020B0706030402020204" pitchFamily="34" charset="0"/>
+            </a:endParaRPr>
+          </a:p>
+        </p:txBody>
+      </p:sp>
+      <p:sp>
+        <p:nvSpPr>
+          <p:cNvPr id="10" name="Oval 9"/>
+          <p:cNvSpPr/>
+          <p:nvPr/>
+        </p:nvSpPr>
+        <p:spPr>
+          <a:xfrm>
+            <a:off x="9053381" y="1095888"/>
+            <a:ext cx="280087" cy="271849"/>
+          </a:xfrm>
+          <a:prstGeom prst="ellipse">
+            <a:avLst/>
+          </a:prstGeom>
+          <a:solidFill>
+            <a:srgbClr val="F5AB0C"/>
+          </a:solidFill>
+          <a:ln>
+            <a:solidFill>
+              <a:schemeClr val="tx1"/>
+            </a:solidFill>
+          </a:ln>
+        </p:spPr>
+        <p:style>
+          <a:lnRef idx="2">
+            <a:schemeClr val="accent1">
+              <a:shade val="50000"/>
+            </a:schemeClr>
+          </a:lnRef>
+          <a:fillRef idx="1">
+            <a:schemeClr val="accent1"/>
+          </a:fillRef>
+          <a:effectRef idx="0">
+            <a:schemeClr val="accent1"/>
+          </a:effectRef>
+          <a:fontRef idx="minor">
+            <a:schemeClr val="lt1"/>
+          </a:fontRef>
+        </p:style>
+        <p:txBody>
+          <a:bodyPr rtlCol="0" anchor="ctr"/>
+          <a:lstStyle/>
+          <a:p>
+            <a:pPr algn="ctr"/>
+            <a:r>
+              <a:rPr lang="en-US" dirty="0">
+                <a:solidFill>
+                  <a:schemeClr val="tx1"/>
+                </a:solidFill>
+                <a:latin typeface="Franklin Gothic Demi Cond" panose="020B0706030402020204" pitchFamily="34" charset="0"/>
+              </a:rPr>
+              <a:t>7</a:t>
+            </a:r>
+          </a:p>
+        </p:txBody>
+      </p:sp>
+      <p:sp>
+        <p:nvSpPr>
+          <p:cNvPr id="13" name="Oval 12"/>
+          <p:cNvSpPr/>
+          <p:nvPr/>
+        </p:nvSpPr>
+        <p:spPr>
+          <a:xfrm>
+            <a:off x="1392189" y="2905896"/>
+            <a:ext cx="280087" cy="271849"/>
+          </a:xfrm>
+          <a:prstGeom prst="ellipse">
+            <a:avLst/>
+          </a:prstGeom>
+          <a:solidFill>
+            <a:srgbClr val="F5AB0C"/>
+          </a:solidFill>
+          <a:ln>
+            <a:solidFill>
+              <a:schemeClr val="tx1"/>
+            </a:solidFill>
+          </a:ln>
+        </p:spPr>
+        <p:style>
+          <a:lnRef idx="2">
+            <a:schemeClr val="accent1">
+              <a:shade val="50000"/>
+            </a:schemeClr>
+          </a:lnRef>
+          <a:fillRef idx="1">
+            <a:schemeClr val="accent1"/>
+          </a:fillRef>
+          <a:effectRef idx="0">
+            <a:schemeClr val="accent1"/>
+          </a:effectRef>
+          <a:fontRef idx="minor">
+            <a:schemeClr val="lt1"/>
+          </a:fontRef>
+        </p:style>
+        <p:txBody>
+          <a:bodyPr rtlCol="0" anchor="ctr"/>
+          <a:lstStyle/>
+          <a:p>
+            <a:pPr algn="ctr"/>
+            <a:r>
+              <a:rPr lang="en-US" dirty="0" smtClean="0">
+                <a:solidFill>
+                  <a:schemeClr val="tx1"/>
+                </a:solidFill>
+                <a:latin typeface="Franklin Gothic Demi Cond" panose="020B0706030402020204" pitchFamily="34" charset="0"/>
+              </a:rPr>
+              <a:t>6</a:t>
+            </a:r>
+            <a:endParaRPr lang="en-US" dirty="0">
+              <a:solidFill>
+                <a:schemeClr val="tx1"/>
+              </a:solidFill>
+              <a:latin typeface="Franklin Gothic Demi Cond" panose="020B0706030402020204" pitchFamily="34" charset="0"/>
+            </a:endParaRPr>
+          </a:p>
+        </p:txBody>
+      </p:sp>
     </p:spTree>
     <p:extLst>
       <p:ext uri="{BB962C8B-B14F-4D97-AF65-F5344CB8AC3E}">
-        <p14:creationId xmlns:p14="http://schemas.microsoft.com/office/powerpoint/2010/main" val="852276173"/>
+        <p14:creationId xmlns:p14="http://schemas.microsoft.com/office/powerpoint/2010/main" val="1176905387"/>
       </p:ext>
     </p:extLst>
   </p:cSld>
@@ -4245,10 +4996,2172 @@
           <a:chExt cx="0" cy="0"/>
         </a:xfrm>
       </p:grpSpPr>
+      <p:pic>
+        <p:nvPicPr>
+          <p:cNvPr id="4" name="Picture 3"/>
+          <p:cNvPicPr>
+            <a:picLocks noChangeAspect="1"/>
+          </p:cNvPicPr>
+          <p:nvPr/>
+        </p:nvPicPr>
+        <p:blipFill>
+          <a:blip r:embed="rId2"/>
+          <a:stretch>
+            <a:fillRect/>
+          </a:stretch>
+        </p:blipFill>
+        <p:spPr>
+          <a:xfrm>
+            <a:off x="228986" y="210708"/>
+            <a:ext cx="8010525" cy="5019675"/>
+          </a:xfrm>
+          <a:prstGeom prst="rect">
+            <a:avLst/>
+          </a:prstGeom>
+        </p:spPr>
+      </p:pic>
+      <p:sp>
+        <p:nvSpPr>
+          <p:cNvPr id="5" name="Oval 4"/>
+          <p:cNvSpPr/>
+          <p:nvPr/>
+        </p:nvSpPr>
+        <p:spPr>
+          <a:xfrm>
+            <a:off x="7158679" y="1231812"/>
+            <a:ext cx="280087" cy="271849"/>
+          </a:xfrm>
+          <a:prstGeom prst="ellipse">
+            <a:avLst/>
+          </a:prstGeom>
+          <a:solidFill>
+            <a:srgbClr val="F5AB0C"/>
+          </a:solidFill>
+          <a:ln>
+            <a:solidFill>
+              <a:schemeClr val="tx1"/>
+            </a:solidFill>
+          </a:ln>
+        </p:spPr>
+        <p:style>
+          <a:lnRef idx="2">
+            <a:schemeClr val="accent1">
+              <a:shade val="50000"/>
+            </a:schemeClr>
+          </a:lnRef>
+          <a:fillRef idx="1">
+            <a:schemeClr val="accent1"/>
+          </a:fillRef>
+          <a:effectRef idx="0">
+            <a:schemeClr val="accent1"/>
+          </a:effectRef>
+          <a:fontRef idx="minor">
+            <a:schemeClr val="lt1"/>
+          </a:fontRef>
+        </p:style>
+        <p:txBody>
+          <a:bodyPr rtlCol="0" anchor="ctr"/>
+          <a:lstStyle/>
+          <a:p>
+            <a:pPr algn="ctr"/>
+            <a:r>
+              <a:rPr lang="en-US" dirty="0" smtClean="0">
+                <a:solidFill>
+                  <a:schemeClr val="tx1"/>
+                </a:solidFill>
+                <a:latin typeface="Franklin Gothic Demi Cond" panose="020B0706030402020204" pitchFamily="34" charset="0"/>
+              </a:rPr>
+              <a:t>1</a:t>
+            </a:r>
+            <a:endParaRPr lang="en-US" dirty="0">
+              <a:solidFill>
+                <a:schemeClr val="tx1"/>
+              </a:solidFill>
+              <a:latin typeface="Franklin Gothic Demi Cond" panose="020B0706030402020204" pitchFamily="34" charset="0"/>
+            </a:endParaRPr>
+          </a:p>
+        </p:txBody>
+      </p:sp>
+      <p:sp>
+        <p:nvSpPr>
+          <p:cNvPr id="6" name="Oval 5"/>
+          <p:cNvSpPr/>
+          <p:nvPr/>
+        </p:nvSpPr>
+        <p:spPr>
+          <a:xfrm>
+            <a:off x="2413685" y="3177745"/>
+            <a:ext cx="280087" cy="271849"/>
+          </a:xfrm>
+          <a:prstGeom prst="ellipse">
+            <a:avLst/>
+          </a:prstGeom>
+          <a:solidFill>
+            <a:srgbClr val="F5AB0C"/>
+          </a:solidFill>
+          <a:ln>
+            <a:solidFill>
+              <a:schemeClr val="tx1"/>
+            </a:solidFill>
+          </a:ln>
+        </p:spPr>
+        <p:style>
+          <a:lnRef idx="2">
+            <a:schemeClr val="accent1">
+              <a:shade val="50000"/>
+            </a:schemeClr>
+          </a:lnRef>
+          <a:fillRef idx="1">
+            <a:schemeClr val="accent1"/>
+          </a:fillRef>
+          <a:effectRef idx="0">
+            <a:schemeClr val="accent1"/>
+          </a:effectRef>
+          <a:fontRef idx="minor">
+            <a:schemeClr val="lt1"/>
+          </a:fontRef>
+        </p:style>
+        <p:txBody>
+          <a:bodyPr rtlCol="0" anchor="ctr"/>
+          <a:lstStyle/>
+          <a:p>
+            <a:pPr algn="ctr"/>
+            <a:r>
+              <a:rPr lang="en-US" dirty="0">
+                <a:solidFill>
+                  <a:schemeClr val="tx1"/>
+                </a:solidFill>
+                <a:latin typeface="Franklin Gothic Demi Cond" panose="020B0706030402020204" pitchFamily="34" charset="0"/>
+              </a:rPr>
+              <a:t>2</a:t>
+            </a:r>
+          </a:p>
+        </p:txBody>
+      </p:sp>
+      <p:sp>
+        <p:nvSpPr>
+          <p:cNvPr id="7" name="Oval 6"/>
+          <p:cNvSpPr/>
+          <p:nvPr/>
+        </p:nvSpPr>
+        <p:spPr>
+          <a:xfrm>
+            <a:off x="4329810" y="2905895"/>
+            <a:ext cx="280087" cy="271849"/>
+          </a:xfrm>
+          <a:prstGeom prst="ellipse">
+            <a:avLst/>
+          </a:prstGeom>
+          <a:solidFill>
+            <a:srgbClr val="F5AB0C"/>
+          </a:solidFill>
+          <a:ln>
+            <a:solidFill>
+              <a:schemeClr val="tx1"/>
+            </a:solidFill>
+          </a:ln>
+        </p:spPr>
+        <p:style>
+          <a:lnRef idx="2">
+            <a:schemeClr val="accent1">
+              <a:shade val="50000"/>
+            </a:schemeClr>
+          </a:lnRef>
+          <a:fillRef idx="1">
+            <a:schemeClr val="accent1"/>
+          </a:fillRef>
+          <a:effectRef idx="0">
+            <a:schemeClr val="accent1"/>
+          </a:effectRef>
+          <a:fontRef idx="minor">
+            <a:schemeClr val="lt1"/>
+          </a:fontRef>
+        </p:style>
+        <p:txBody>
+          <a:bodyPr rtlCol="0" anchor="ctr"/>
+          <a:lstStyle/>
+          <a:p>
+            <a:pPr algn="ctr"/>
+            <a:r>
+              <a:rPr lang="en-US" dirty="0">
+                <a:solidFill>
+                  <a:schemeClr val="tx1"/>
+                </a:solidFill>
+                <a:latin typeface="Franklin Gothic Demi Cond" panose="020B0706030402020204" pitchFamily="34" charset="0"/>
+              </a:rPr>
+              <a:t>3</a:t>
+            </a:r>
+          </a:p>
+        </p:txBody>
+      </p:sp>
+      <p:sp>
+        <p:nvSpPr>
+          <p:cNvPr id="8" name="Oval 7"/>
+          <p:cNvSpPr/>
+          <p:nvPr/>
+        </p:nvSpPr>
+        <p:spPr>
+          <a:xfrm>
+            <a:off x="4932786" y="2905895"/>
+            <a:ext cx="280087" cy="271849"/>
+          </a:xfrm>
+          <a:prstGeom prst="ellipse">
+            <a:avLst/>
+          </a:prstGeom>
+          <a:solidFill>
+            <a:srgbClr val="F5AB0C"/>
+          </a:solidFill>
+          <a:ln>
+            <a:solidFill>
+              <a:schemeClr val="tx1"/>
+            </a:solidFill>
+          </a:ln>
+        </p:spPr>
+        <p:style>
+          <a:lnRef idx="2">
+            <a:schemeClr val="accent1">
+              <a:shade val="50000"/>
+            </a:schemeClr>
+          </a:lnRef>
+          <a:fillRef idx="1">
+            <a:schemeClr val="accent1"/>
+          </a:fillRef>
+          <a:effectRef idx="0">
+            <a:schemeClr val="accent1"/>
+          </a:effectRef>
+          <a:fontRef idx="minor">
+            <a:schemeClr val="lt1"/>
+          </a:fontRef>
+        </p:style>
+        <p:txBody>
+          <a:bodyPr rtlCol="0" anchor="ctr"/>
+          <a:lstStyle/>
+          <a:p>
+            <a:pPr algn="ctr"/>
+            <a:r>
+              <a:rPr lang="en-US" dirty="0" smtClean="0">
+                <a:solidFill>
+                  <a:schemeClr val="tx1"/>
+                </a:solidFill>
+                <a:latin typeface="Franklin Gothic Demi Cond" panose="020B0706030402020204" pitchFamily="34" charset="0"/>
+              </a:rPr>
+              <a:t>4</a:t>
+            </a:r>
+            <a:endParaRPr lang="en-US" dirty="0">
+              <a:solidFill>
+                <a:schemeClr val="tx1"/>
+              </a:solidFill>
+              <a:latin typeface="Franklin Gothic Demi Cond" panose="020B0706030402020204" pitchFamily="34" charset="0"/>
+            </a:endParaRPr>
+          </a:p>
+        </p:txBody>
+      </p:sp>
     </p:spTree>
     <p:extLst>
       <p:ext uri="{BB962C8B-B14F-4D97-AF65-F5344CB8AC3E}">
-        <p14:creationId xmlns:p14="http://schemas.microsoft.com/office/powerpoint/2010/main" val="3372529483"/>
+        <p14:creationId xmlns:p14="http://schemas.microsoft.com/office/powerpoint/2010/main" val="852276173"/>
+      </p:ext>
+    </p:extLst>
+  </p:cSld>
+  <p:clrMapOvr>
+    <a:masterClrMapping/>
+  </p:clrMapOvr>
+</p:sld>
+</file>
+
+<file path=ppt/slides/slide5.xml><?xml version="1.0" encoding="utf-8"?>
+<p:sld xmlns:a="http://schemas.openxmlformats.org/drawingml/2006/main" xmlns:r="http://schemas.openxmlformats.org/officeDocument/2006/relationships" xmlns:p="http://schemas.openxmlformats.org/presentationml/2006/main">
+  <p:cSld>
+    <p:spTree>
+      <p:nvGrpSpPr>
+        <p:cNvPr id="1" name=""/>
+        <p:cNvGrpSpPr/>
+        <p:nvPr/>
+      </p:nvGrpSpPr>
+      <p:grpSpPr>
+        <a:xfrm>
+          <a:off x="0" y="0"/>
+          <a:ext cx="0" cy="0"/>
+          <a:chOff x="0" y="0"/>
+          <a:chExt cx="0" cy="0"/>
+        </a:xfrm>
+      </p:grpSpPr>
+      <p:pic>
+        <p:nvPicPr>
+          <p:cNvPr id="2" name="Picture 1"/>
+          <p:cNvPicPr>
+            <a:picLocks noChangeAspect="1"/>
+          </p:cNvPicPr>
+          <p:nvPr/>
+        </p:nvPicPr>
+        <p:blipFill>
+          <a:blip r:embed="rId2"/>
+          <a:stretch>
+            <a:fillRect/>
+          </a:stretch>
+        </p:blipFill>
+        <p:spPr>
+          <a:xfrm>
+            <a:off x="1990725" y="581025"/>
+            <a:ext cx="8210550" cy="5695950"/>
+          </a:xfrm>
+          <a:prstGeom prst="rect">
+            <a:avLst/>
+          </a:prstGeom>
+        </p:spPr>
+      </p:pic>
+      <p:sp>
+        <p:nvSpPr>
+          <p:cNvPr id="3" name="Oval 2"/>
+          <p:cNvSpPr/>
+          <p:nvPr/>
+        </p:nvSpPr>
+        <p:spPr>
+          <a:xfrm>
+            <a:off x="9848850" y="647700"/>
+            <a:ext cx="257174" cy="271849"/>
+          </a:xfrm>
+          <a:prstGeom prst="ellipse">
+            <a:avLst/>
+          </a:prstGeom>
+          <a:solidFill>
+            <a:srgbClr val="F5AB0C"/>
+          </a:solidFill>
+          <a:ln>
+            <a:solidFill>
+              <a:schemeClr val="tx1"/>
+            </a:solidFill>
+          </a:ln>
+        </p:spPr>
+        <p:style>
+          <a:lnRef idx="2">
+            <a:schemeClr val="accent1">
+              <a:shade val="50000"/>
+            </a:schemeClr>
+          </a:lnRef>
+          <a:fillRef idx="1">
+            <a:schemeClr val="accent1"/>
+          </a:fillRef>
+          <a:effectRef idx="0">
+            <a:schemeClr val="accent1"/>
+          </a:effectRef>
+          <a:fontRef idx="minor">
+            <a:schemeClr val="lt1"/>
+          </a:fontRef>
+        </p:style>
+        <p:txBody>
+          <a:bodyPr rtlCol="0" anchor="ctr"/>
+          <a:lstStyle/>
+          <a:p>
+            <a:pPr algn="ctr"/>
+            <a:r>
+              <a:rPr lang="en-US" dirty="0" smtClean="0">
+                <a:solidFill>
+                  <a:schemeClr val="tx1"/>
+                </a:solidFill>
+                <a:latin typeface="Franklin Gothic Demi Cond" panose="020B0706030402020204" pitchFamily="34" charset="0"/>
+              </a:rPr>
+              <a:t>1</a:t>
+            </a:r>
+            <a:endParaRPr lang="en-US" dirty="0">
+              <a:solidFill>
+                <a:schemeClr val="tx1"/>
+              </a:solidFill>
+              <a:latin typeface="Franklin Gothic Demi Cond" panose="020B0706030402020204" pitchFamily="34" charset="0"/>
+            </a:endParaRPr>
+          </a:p>
+        </p:txBody>
+      </p:sp>
+      <p:sp>
+        <p:nvSpPr>
+          <p:cNvPr id="4" name="Oval 3"/>
+          <p:cNvSpPr/>
+          <p:nvPr/>
+        </p:nvSpPr>
+        <p:spPr>
+          <a:xfrm>
+            <a:off x="5606361" y="1362075"/>
+            <a:ext cx="280087" cy="271849"/>
+          </a:xfrm>
+          <a:prstGeom prst="ellipse">
+            <a:avLst/>
+          </a:prstGeom>
+          <a:solidFill>
+            <a:srgbClr val="F5AB0C"/>
+          </a:solidFill>
+          <a:ln>
+            <a:solidFill>
+              <a:schemeClr val="tx1"/>
+            </a:solidFill>
+          </a:ln>
+        </p:spPr>
+        <p:style>
+          <a:lnRef idx="2">
+            <a:schemeClr val="accent1">
+              <a:shade val="50000"/>
+            </a:schemeClr>
+          </a:lnRef>
+          <a:fillRef idx="1">
+            <a:schemeClr val="accent1"/>
+          </a:fillRef>
+          <a:effectRef idx="0">
+            <a:schemeClr val="accent1"/>
+          </a:effectRef>
+          <a:fontRef idx="minor">
+            <a:schemeClr val="lt1"/>
+          </a:fontRef>
+        </p:style>
+        <p:txBody>
+          <a:bodyPr rtlCol="0" anchor="ctr"/>
+          <a:lstStyle/>
+          <a:p>
+            <a:pPr algn="ctr"/>
+            <a:r>
+              <a:rPr lang="en-US" dirty="0">
+                <a:solidFill>
+                  <a:schemeClr val="tx1"/>
+                </a:solidFill>
+                <a:latin typeface="Franklin Gothic Demi Cond" panose="020B0706030402020204" pitchFamily="34" charset="0"/>
+              </a:rPr>
+              <a:t>2</a:t>
+            </a:r>
+          </a:p>
+        </p:txBody>
+      </p:sp>
+    </p:spTree>
+    <p:extLst>
+      <p:ext uri="{BB962C8B-B14F-4D97-AF65-F5344CB8AC3E}">
+        <p14:creationId xmlns:p14="http://schemas.microsoft.com/office/powerpoint/2010/main" val="751304807"/>
+      </p:ext>
+    </p:extLst>
+  </p:cSld>
+  <p:clrMapOvr>
+    <a:masterClrMapping/>
+  </p:clrMapOvr>
+</p:sld>
+</file>
+
+<file path=ppt/slides/slide6.xml><?xml version="1.0" encoding="utf-8"?>
+<p:sld xmlns:a="http://schemas.openxmlformats.org/drawingml/2006/main" xmlns:r="http://schemas.openxmlformats.org/officeDocument/2006/relationships" xmlns:p="http://schemas.openxmlformats.org/presentationml/2006/main">
+  <p:cSld>
+    <p:spTree>
+      <p:nvGrpSpPr>
+        <p:cNvPr id="1" name=""/>
+        <p:cNvGrpSpPr/>
+        <p:nvPr/>
+      </p:nvGrpSpPr>
+      <p:grpSpPr>
+        <a:xfrm>
+          <a:off x="0" y="0"/>
+          <a:ext cx="0" cy="0"/>
+          <a:chOff x="0" y="0"/>
+          <a:chExt cx="0" cy="0"/>
+        </a:xfrm>
+      </p:grpSpPr>
+      <p:pic>
+        <p:nvPicPr>
+          <p:cNvPr id="2" name="Picture 1"/>
+          <p:cNvPicPr>
+            <a:picLocks noChangeAspect="1"/>
+          </p:cNvPicPr>
+          <p:nvPr/>
+        </p:nvPicPr>
+        <p:blipFill>
+          <a:blip r:embed="rId2"/>
+          <a:stretch>
+            <a:fillRect/>
+          </a:stretch>
+        </p:blipFill>
+        <p:spPr>
+          <a:xfrm>
+            <a:off x="2009775" y="781050"/>
+            <a:ext cx="8172450" cy="5295900"/>
+          </a:xfrm>
+          <a:prstGeom prst="rect">
+            <a:avLst/>
+          </a:prstGeom>
+        </p:spPr>
+      </p:pic>
+      <p:sp>
+        <p:nvSpPr>
+          <p:cNvPr id="3" name="Oval 2"/>
+          <p:cNvSpPr/>
+          <p:nvPr/>
+        </p:nvSpPr>
+        <p:spPr>
+          <a:xfrm>
+            <a:off x="5886188" y="1551159"/>
+            <a:ext cx="280087" cy="271849"/>
+          </a:xfrm>
+          <a:prstGeom prst="ellipse">
+            <a:avLst/>
+          </a:prstGeom>
+          <a:solidFill>
+            <a:srgbClr val="F5AB0C"/>
+          </a:solidFill>
+          <a:ln>
+            <a:solidFill>
+              <a:schemeClr val="tx1"/>
+            </a:solidFill>
+          </a:ln>
+        </p:spPr>
+        <p:style>
+          <a:lnRef idx="2">
+            <a:schemeClr val="accent1">
+              <a:shade val="50000"/>
+            </a:schemeClr>
+          </a:lnRef>
+          <a:fillRef idx="1">
+            <a:schemeClr val="accent1"/>
+          </a:fillRef>
+          <a:effectRef idx="0">
+            <a:schemeClr val="accent1"/>
+          </a:effectRef>
+          <a:fontRef idx="minor">
+            <a:schemeClr val="lt1"/>
+          </a:fontRef>
+        </p:style>
+        <p:txBody>
+          <a:bodyPr rtlCol="0" anchor="ctr"/>
+          <a:lstStyle/>
+          <a:p>
+            <a:pPr algn="ctr"/>
+            <a:r>
+              <a:rPr lang="en-US" dirty="0">
+                <a:solidFill>
+                  <a:schemeClr val="tx1"/>
+                </a:solidFill>
+                <a:latin typeface="Franklin Gothic Demi Cond" panose="020B0706030402020204" pitchFamily="34" charset="0"/>
+              </a:rPr>
+              <a:t>3</a:t>
+            </a:r>
+          </a:p>
+        </p:txBody>
+      </p:sp>
+      <p:sp>
+        <p:nvSpPr>
+          <p:cNvPr id="4" name="Oval 3"/>
+          <p:cNvSpPr/>
+          <p:nvPr/>
+        </p:nvSpPr>
+        <p:spPr>
+          <a:xfrm>
+            <a:off x="9419193" y="4199684"/>
+            <a:ext cx="280087" cy="271849"/>
+          </a:xfrm>
+          <a:prstGeom prst="ellipse">
+            <a:avLst/>
+          </a:prstGeom>
+          <a:solidFill>
+            <a:srgbClr val="F5AB0C"/>
+          </a:solidFill>
+          <a:ln>
+            <a:solidFill>
+              <a:schemeClr val="tx1"/>
+            </a:solidFill>
+          </a:ln>
+        </p:spPr>
+        <p:style>
+          <a:lnRef idx="2">
+            <a:schemeClr val="accent1">
+              <a:shade val="50000"/>
+            </a:schemeClr>
+          </a:lnRef>
+          <a:fillRef idx="1">
+            <a:schemeClr val="accent1"/>
+          </a:fillRef>
+          <a:effectRef idx="0">
+            <a:schemeClr val="accent1"/>
+          </a:effectRef>
+          <a:fontRef idx="minor">
+            <a:schemeClr val="lt1"/>
+          </a:fontRef>
+        </p:style>
+        <p:txBody>
+          <a:bodyPr rtlCol="0" anchor="ctr"/>
+          <a:lstStyle/>
+          <a:p>
+            <a:pPr algn="ctr"/>
+            <a:r>
+              <a:rPr lang="en-US" dirty="0" smtClean="0">
+                <a:solidFill>
+                  <a:schemeClr val="tx1"/>
+                </a:solidFill>
+                <a:latin typeface="Franklin Gothic Demi Cond" panose="020B0706030402020204" pitchFamily="34" charset="0"/>
+              </a:rPr>
+              <a:t>4</a:t>
+            </a:r>
+            <a:endParaRPr lang="en-US" dirty="0">
+              <a:solidFill>
+                <a:schemeClr val="tx1"/>
+              </a:solidFill>
+              <a:latin typeface="Franklin Gothic Demi Cond" panose="020B0706030402020204" pitchFamily="34" charset="0"/>
+            </a:endParaRPr>
+          </a:p>
+        </p:txBody>
+      </p:sp>
+      <p:sp>
+        <p:nvSpPr>
+          <p:cNvPr id="5" name="Oval 4"/>
+          <p:cNvSpPr/>
+          <p:nvPr/>
+        </p:nvSpPr>
+        <p:spPr>
+          <a:xfrm>
+            <a:off x="5886187" y="4668984"/>
+            <a:ext cx="280087" cy="271849"/>
+          </a:xfrm>
+          <a:prstGeom prst="ellipse">
+            <a:avLst/>
+          </a:prstGeom>
+          <a:solidFill>
+            <a:srgbClr val="F5AB0C"/>
+          </a:solidFill>
+          <a:ln>
+            <a:solidFill>
+              <a:schemeClr val="tx1"/>
+            </a:solidFill>
+          </a:ln>
+        </p:spPr>
+        <p:style>
+          <a:lnRef idx="2">
+            <a:schemeClr val="accent1">
+              <a:shade val="50000"/>
+            </a:schemeClr>
+          </a:lnRef>
+          <a:fillRef idx="1">
+            <a:schemeClr val="accent1"/>
+          </a:fillRef>
+          <a:effectRef idx="0">
+            <a:schemeClr val="accent1"/>
+          </a:effectRef>
+          <a:fontRef idx="minor">
+            <a:schemeClr val="lt1"/>
+          </a:fontRef>
+        </p:style>
+        <p:txBody>
+          <a:bodyPr rtlCol="0" anchor="ctr"/>
+          <a:lstStyle/>
+          <a:p>
+            <a:pPr algn="ctr"/>
+            <a:r>
+              <a:rPr lang="en-US" dirty="0" smtClean="0">
+                <a:solidFill>
+                  <a:schemeClr val="tx1"/>
+                </a:solidFill>
+                <a:latin typeface="Franklin Gothic Demi Cond" panose="020B0706030402020204" pitchFamily="34" charset="0"/>
+              </a:rPr>
+              <a:t>5</a:t>
+            </a:r>
+            <a:endParaRPr lang="en-US" dirty="0">
+              <a:solidFill>
+                <a:schemeClr val="tx1"/>
+              </a:solidFill>
+              <a:latin typeface="Franklin Gothic Demi Cond" panose="020B0706030402020204" pitchFamily="34" charset="0"/>
+            </a:endParaRPr>
+          </a:p>
+        </p:txBody>
+      </p:sp>
+      <p:sp>
+        <p:nvSpPr>
+          <p:cNvPr id="6" name="Oval 5"/>
+          <p:cNvSpPr/>
+          <p:nvPr/>
+        </p:nvSpPr>
+        <p:spPr>
+          <a:xfrm>
+            <a:off x="8881160" y="5372967"/>
+            <a:ext cx="280087" cy="271849"/>
+          </a:xfrm>
+          <a:prstGeom prst="ellipse">
+            <a:avLst/>
+          </a:prstGeom>
+          <a:solidFill>
+            <a:srgbClr val="F5AB0C"/>
+          </a:solidFill>
+          <a:ln>
+            <a:solidFill>
+              <a:schemeClr val="tx1"/>
+            </a:solidFill>
+          </a:ln>
+        </p:spPr>
+        <p:style>
+          <a:lnRef idx="2">
+            <a:schemeClr val="accent1">
+              <a:shade val="50000"/>
+            </a:schemeClr>
+          </a:lnRef>
+          <a:fillRef idx="1">
+            <a:schemeClr val="accent1"/>
+          </a:fillRef>
+          <a:effectRef idx="0">
+            <a:schemeClr val="accent1"/>
+          </a:effectRef>
+          <a:fontRef idx="minor">
+            <a:schemeClr val="lt1"/>
+          </a:fontRef>
+        </p:style>
+        <p:txBody>
+          <a:bodyPr rtlCol="0" anchor="ctr"/>
+          <a:lstStyle/>
+          <a:p>
+            <a:pPr algn="ctr"/>
+            <a:r>
+              <a:rPr lang="en-US" dirty="0" smtClean="0">
+                <a:solidFill>
+                  <a:schemeClr val="tx1"/>
+                </a:solidFill>
+                <a:latin typeface="Franklin Gothic Demi Cond" panose="020B0706030402020204" pitchFamily="34" charset="0"/>
+              </a:rPr>
+              <a:t>6</a:t>
+            </a:r>
+            <a:endParaRPr lang="en-US" dirty="0">
+              <a:solidFill>
+                <a:schemeClr val="tx1"/>
+              </a:solidFill>
+              <a:latin typeface="Franklin Gothic Demi Cond" panose="020B0706030402020204" pitchFamily="34" charset="0"/>
+            </a:endParaRPr>
+          </a:p>
+        </p:txBody>
+      </p:sp>
+    </p:spTree>
+    <p:extLst>
+      <p:ext uri="{BB962C8B-B14F-4D97-AF65-F5344CB8AC3E}">
+        <p14:creationId xmlns:p14="http://schemas.microsoft.com/office/powerpoint/2010/main" val="3363141378"/>
+      </p:ext>
+    </p:extLst>
+  </p:cSld>
+  <p:clrMapOvr>
+    <a:masterClrMapping/>
+  </p:clrMapOvr>
+</p:sld>
+</file>
+
+<file path=ppt/slides/slide7.xml><?xml version="1.0" encoding="utf-8"?>
+<p:sld xmlns:a="http://schemas.openxmlformats.org/drawingml/2006/main" xmlns:r="http://schemas.openxmlformats.org/officeDocument/2006/relationships" xmlns:p="http://schemas.openxmlformats.org/presentationml/2006/main">
+  <p:cSld>
+    <p:spTree>
+      <p:nvGrpSpPr>
+        <p:cNvPr id="1" name=""/>
+        <p:cNvGrpSpPr/>
+        <p:nvPr/>
+      </p:nvGrpSpPr>
+      <p:grpSpPr>
+        <a:xfrm>
+          <a:off x="0" y="0"/>
+          <a:ext cx="0" cy="0"/>
+          <a:chOff x="0" y="0"/>
+          <a:chExt cx="0" cy="0"/>
+        </a:xfrm>
+      </p:grpSpPr>
+      <p:pic>
+        <p:nvPicPr>
+          <p:cNvPr id="2" name="Picture 1"/>
+          <p:cNvPicPr>
+            <a:picLocks noChangeAspect="1"/>
+          </p:cNvPicPr>
+          <p:nvPr/>
+        </p:nvPicPr>
+        <p:blipFill>
+          <a:blip r:embed="rId2"/>
+          <a:stretch>
+            <a:fillRect/>
+          </a:stretch>
+        </p:blipFill>
+        <p:spPr>
+          <a:xfrm>
+            <a:off x="2071687" y="1566862"/>
+            <a:ext cx="8048625" cy="3724275"/>
+          </a:xfrm>
+          <a:prstGeom prst="rect">
+            <a:avLst/>
+          </a:prstGeom>
+        </p:spPr>
+      </p:pic>
+      <p:sp>
+        <p:nvSpPr>
+          <p:cNvPr id="3" name="Oval 2"/>
+          <p:cNvSpPr/>
+          <p:nvPr/>
+        </p:nvSpPr>
+        <p:spPr>
+          <a:xfrm>
+            <a:off x="9740212" y="1746547"/>
+            <a:ext cx="280087" cy="271849"/>
+          </a:xfrm>
+          <a:prstGeom prst="ellipse">
+            <a:avLst/>
+          </a:prstGeom>
+          <a:solidFill>
+            <a:srgbClr val="F5AB0C"/>
+          </a:solidFill>
+          <a:ln>
+            <a:solidFill>
+              <a:schemeClr val="tx1"/>
+            </a:solidFill>
+          </a:ln>
+        </p:spPr>
+        <p:style>
+          <a:lnRef idx="2">
+            <a:schemeClr val="accent1">
+              <a:shade val="50000"/>
+            </a:schemeClr>
+          </a:lnRef>
+          <a:fillRef idx="1">
+            <a:schemeClr val="accent1"/>
+          </a:fillRef>
+          <a:effectRef idx="0">
+            <a:schemeClr val="accent1"/>
+          </a:effectRef>
+          <a:fontRef idx="minor">
+            <a:schemeClr val="lt1"/>
+          </a:fontRef>
+        </p:style>
+        <p:txBody>
+          <a:bodyPr rtlCol="0" anchor="ctr"/>
+          <a:lstStyle/>
+          <a:p>
+            <a:pPr algn="ctr"/>
+            <a:r>
+              <a:rPr lang="en-US" dirty="0" smtClean="0">
+                <a:solidFill>
+                  <a:schemeClr val="tx1"/>
+                </a:solidFill>
+                <a:latin typeface="Franklin Gothic Demi Cond" panose="020B0706030402020204" pitchFamily="34" charset="0"/>
+              </a:rPr>
+              <a:t>1</a:t>
+            </a:r>
+            <a:endParaRPr lang="en-US" dirty="0">
+              <a:solidFill>
+                <a:schemeClr val="tx1"/>
+              </a:solidFill>
+              <a:latin typeface="Franklin Gothic Demi Cond" panose="020B0706030402020204" pitchFamily="34" charset="0"/>
+            </a:endParaRPr>
+          </a:p>
+        </p:txBody>
+      </p:sp>
+      <p:sp>
+        <p:nvSpPr>
+          <p:cNvPr id="4" name="Oval 3"/>
+          <p:cNvSpPr/>
+          <p:nvPr/>
+        </p:nvSpPr>
+        <p:spPr>
+          <a:xfrm>
+            <a:off x="9600168" y="2750083"/>
+            <a:ext cx="280087" cy="271849"/>
+          </a:xfrm>
+          <a:prstGeom prst="ellipse">
+            <a:avLst/>
+          </a:prstGeom>
+          <a:solidFill>
+            <a:srgbClr val="F5AB0C"/>
+          </a:solidFill>
+          <a:ln>
+            <a:solidFill>
+              <a:schemeClr val="tx1"/>
+            </a:solidFill>
+          </a:ln>
+        </p:spPr>
+        <p:style>
+          <a:lnRef idx="2">
+            <a:schemeClr val="accent1">
+              <a:shade val="50000"/>
+            </a:schemeClr>
+          </a:lnRef>
+          <a:fillRef idx="1">
+            <a:schemeClr val="accent1"/>
+          </a:fillRef>
+          <a:effectRef idx="0">
+            <a:schemeClr val="accent1"/>
+          </a:effectRef>
+          <a:fontRef idx="minor">
+            <a:schemeClr val="lt1"/>
+          </a:fontRef>
+        </p:style>
+        <p:txBody>
+          <a:bodyPr rtlCol="0" anchor="ctr"/>
+          <a:lstStyle/>
+          <a:p>
+            <a:pPr algn="ctr"/>
+            <a:r>
+              <a:rPr lang="en-US" dirty="0">
+                <a:solidFill>
+                  <a:schemeClr val="tx1"/>
+                </a:solidFill>
+                <a:latin typeface="Franklin Gothic Demi Cond" panose="020B0706030402020204" pitchFamily="34" charset="0"/>
+              </a:rPr>
+              <a:t>2</a:t>
+            </a:r>
+          </a:p>
+        </p:txBody>
+      </p:sp>
+      <p:sp>
+        <p:nvSpPr>
+          <p:cNvPr id="5" name="Oval 4"/>
+          <p:cNvSpPr/>
+          <p:nvPr/>
+        </p:nvSpPr>
+        <p:spPr>
+          <a:xfrm>
+            <a:off x="6448163" y="3199298"/>
+            <a:ext cx="280087" cy="271849"/>
+          </a:xfrm>
+          <a:prstGeom prst="ellipse">
+            <a:avLst/>
+          </a:prstGeom>
+          <a:solidFill>
+            <a:srgbClr val="F5AB0C"/>
+          </a:solidFill>
+          <a:ln>
+            <a:solidFill>
+              <a:schemeClr val="tx1"/>
+            </a:solidFill>
+          </a:ln>
+        </p:spPr>
+        <p:style>
+          <a:lnRef idx="2">
+            <a:schemeClr val="accent1">
+              <a:shade val="50000"/>
+            </a:schemeClr>
+          </a:lnRef>
+          <a:fillRef idx="1">
+            <a:schemeClr val="accent1"/>
+          </a:fillRef>
+          <a:effectRef idx="0">
+            <a:schemeClr val="accent1"/>
+          </a:effectRef>
+          <a:fontRef idx="minor">
+            <a:schemeClr val="lt1"/>
+          </a:fontRef>
+        </p:style>
+        <p:txBody>
+          <a:bodyPr rtlCol="0" anchor="ctr"/>
+          <a:lstStyle/>
+          <a:p>
+            <a:pPr algn="ctr"/>
+            <a:r>
+              <a:rPr lang="en-US" dirty="0">
+                <a:solidFill>
+                  <a:schemeClr val="tx1"/>
+                </a:solidFill>
+                <a:latin typeface="Franklin Gothic Demi Cond" panose="020B0706030402020204" pitchFamily="34" charset="0"/>
+              </a:rPr>
+              <a:t>3</a:t>
+            </a:r>
+          </a:p>
+        </p:txBody>
+      </p:sp>
+      <p:sp>
+        <p:nvSpPr>
+          <p:cNvPr id="6" name="Oval 5"/>
+          <p:cNvSpPr/>
+          <p:nvPr/>
+        </p:nvSpPr>
+        <p:spPr>
+          <a:xfrm>
+            <a:off x="8004150" y="3199299"/>
+            <a:ext cx="280087" cy="271849"/>
+          </a:xfrm>
+          <a:prstGeom prst="ellipse">
+            <a:avLst/>
+          </a:prstGeom>
+          <a:solidFill>
+            <a:srgbClr val="F5AB0C"/>
+          </a:solidFill>
+          <a:ln>
+            <a:solidFill>
+              <a:schemeClr val="tx1"/>
+            </a:solidFill>
+          </a:ln>
+        </p:spPr>
+        <p:style>
+          <a:lnRef idx="2">
+            <a:schemeClr val="accent1">
+              <a:shade val="50000"/>
+            </a:schemeClr>
+          </a:lnRef>
+          <a:fillRef idx="1">
+            <a:schemeClr val="accent1"/>
+          </a:fillRef>
+          <a:effectRef idx="0">
+            <a:schemeClr val="accent1"/>
+          </a:effectRef>
+          <a:fontRef idx="minor">
+            <a:schemeClr val="lt1"/>
+          </a:fontRef>
+        </p:style>
+        <p:txBody>
+          <a:bodyPr rtlCol="0" anchor="ctr"/>
+          <a:lstStyle/>
+          <a:p>
+            <a:pPr algn="ctr"/>
+            <a:r>
+              <a:rPr lang="en-US" dirty="0" smtClean="0">
+                <a:solidFill>
+                  <a:schemeClr val="tx1"/>
+                </a:solidFill>
+                <a:latin typeface="Franklin Gothic Demi Cond" panose="020B0706030402020204" pitchFamily="34" charset="0"/>
+              </a:rPr>
+              <a:t>4</a:t>
+            </a:r>
+            <a:endParaRPr lang="en-US" dirty="0">
+              <a:solidFill>
+                <a:schemeClr val="tx1"/>
+              </a:solidFill>
+              <a:latin typeface="Franklin Gothic Demi Cond" panose="020B0706030402020204" pitchFamily="34" charset="0"/>
+            </a:endParaRPr>
+          </a:p>
+        </p:txBody>
+      </p:sp>
+      <p:sp>
+        <p:nvSpPr>
+          <p:cNvPr id="7" name="Oval 6"/>
+          <p:cNvSpPr/>
+          <p:nvPr/>
+        </p:nvSpPr>
+        <p:spPr>
+          <a:xfrm>
+            <a:off x="8773696" y="3199299"/>
+            <a:ext cx="280087" cy="271849"/>
+          </a:xfrm>
+          <a:prstGeom prst="ellipse">
+            <a:avLst/>
+          </a:prstGeom>
+          <a:solidFill>
+            <a:srgbClr val="F5AB0C"/>
+          </a:solidFill>
+          <a:ln>
+            <a:solidFill>
+              <a:schemeClr val="tx1"/>
+            </a:solidFill>
+          </a:ln>
+        </p:spPr>
+        <p:style>
+          <a:lnRef idx="2">
+            <a:schemeClr val="accent1">
+              <a:shade val="50000"/>
+            </a:schemeClr>
+          </a:lnRef>
+          <a:fillRef idx="1">
+            <a:schemeClr val="accent1"/>
+          </a:fillRef>
+          <a:effectRef idx="0">
+            <a:schemeClr val="accent1"/>
+          </a:effectRef>
+          <a:fontRef idx="minor">
+            <a:schemeClr val="lt1"/>
+          </a:fontRef>
+        </p:style>
+        <p:txBody>
+          <a:bodyPr rtlCol="0" anchor="ctr"/>
+          <a:lstStyle/>
+          <a:p>
+            <a:pPr algn="ctr"/>
+            <a:r>
+              <a:rPr lang="en-US" dirty="0" smtClean="0">
+                <a:solidFill>
+                  <a:schemeClr val="tx1"/>
+                </a:solidFill>
+                <a:latin typeface="Franklin Gothic Demi Cond" panose="020B0706030402020204" pitchFamily="34" charset="0"/>
+              </a:rPr>
+              <a:t>5</a:t>
+            </a:r>
+            <a:endParaRPr lang="en-US" dirty="0">
+              <a:solidFill>
+                <a:schemeClr val="tx1"/>
+              </a:solidFill>
+              <a:latin typeface="Franklin Gothic Demi Cond" panose="020B0706030402020204" pitchFamily="34" charset="0"/>
+            </a:endParaRPr>
+          </a:p>
+        </p:txBody>
+      </p:sp>
+      <p:sp>
+        <p:nvSpPr>
+          <p:cNvPr id="8" name="Oval 7"/>
+          <p:cNvSpPr/>
+          <p:nvPr/>
+        </p:nvSpPr>
+        <p:spPr>
+          <a:xfrm>
+            <a:off x="9543242" y="3199300"/>
+            <a:ext cx="280087" cy="271849"/>
+          </a:xfrm>
+          <a:prstGeom prst="ellipse">
+            <a:avLst/>
+          </a:prstGeom>
+          <a:solidFill>
+            <a:srgbClr val="F5AB0C"/>
+          </a:solidFill>
+          <a:ln>
+            <a:solidFill>
+              <a:schemeClr val="tx1"/>
+            </a:solidFill>
+          </a:ln>
+        </p:spPr>
+        <p:style>
+          <a:lnRef idx="2">
+            <a:schemeClr val="accent1">
+              <a:shade val="50000"/>
+            </a:schemeClr>
+          </a:lnRef>
+          <a:fillRef idx="1">
+            <a:schemeClr val="accent1"/>
+          </a:fillRef>
+          <a:effectRef idx="0">
+            <a:schemeClr val="accent1"/>
+          </a:effectRef>
+          <a:fontRef idx="minor">
+            <a:schemeClr val="lt1"/>
+          </a:fontRef>
+        </p:style>
+        <p:txBody>
+          <a:bodyPr rtlCol="0" anchor="ctr"/>
+          <a:lstStyle/>
+          <a:p>
+            <a:pPr algn="ctr"/>
+            <a:r>
+              <a:rPr lang="en-US" dirty="0" smtClean="0">
+                <a:solidFill>
+                  <a:schemeClr val="tx1"/>
+                </a:solidFill>
+                <a:latin typeface="Franklin Gothic Demi Cond" panose="020B0706030402020204" pitchFamily="34" charset="0"/>
+              </a:rPr>
+              <a:t>6</a:t>
+            </a:r>
+            <a:endParaRPr lang="en-US" dirty="0">
+              <a:solidFill>
+                <a:schemeClr val="tx1"/>
+              </a:solidFill>
+              <a:latin typeface="Franklin Gothic Demi Cond" panose="020B0706030402020204" pitchFamily="34" charset="0"/>
+            </a:endParaRPr>
+          </a:p>
+        </p:txBody>
+      </p:sp>
+    </p:spTree>
+    <p:extLst>
+      <p:ext uri="{BB962C8B-B14F-4D97-AF65-F5344CB8AC3E}">
+        <p14:creationId xmlns:p14="http://schemas.microsoft.com/office/powerpoint/2010/main" val="655434223"/>
+      </p:ext>
+    </p:extLst>
+  </p:cSld>
+  <p:clrMapOvr>
+    <a:masterClrMapping/>
+  </p:clrMapOvr>
+</p:sld>
+</file>
+
+<file path=ppt/slides/slide8.xml><?xml version="1.0" encoding="utf-8"?>
+<p:sld xmlns:a="http://schemas.openxmlformats.org/drawingml/2006/main" xmlns:r="http://schemas.openxmlformats.org/officeDocument/2006/relationships" xmlns:p="http://schemas.openxmlformats.org/presentationml/2006/main">
+  <p:cSld>
+    <p:spTree>
+      <p:nvGrpSpPr>
+        <p:cNvPr id="1" name=""/>
+        <p:cNvGrpSpPr/>
+        <p:nvPr/>
+      </p:nvGrpSpPr>
+      <p:grpSpPr>
+        <a:xfrm>
+          <a:off x="0" y="0"/>
+          <a:ext cx="0" cy="0"/>
+          <a:chOff x="0" y="0"/>
+          <a:chExt cx="0" cy="0"/>
+        </a:xfrm>
+      </p:grpSpPr>
+      <p:pic>
+        <p:nvPicPr>
+          <p:cNvPr id="2" name="Picture 1"/>
+          <p:cNvPicPr>
+            <a:picLocks noChangeAspect="1"/>
+          </p:cNvPicPr>
+          <p:nvPr/>
+        </p:nvPicPr>
+        <p:blipFill>
+          <a:blip r:embed="rId2"/>
+          <a:stretch>
+            <a:fillRect/>
+          </a:stretch>
+        </p:blipFill>
+        <p:spPr>
+          <a:xfrm>
+            <a:off x="2352675" y="604837"/>
+            <a:ext cx="7486650" cy="5648325"/>
+          </a:xfrm>
+          <a:prstGeom prst="rect">
+            <a:avLst/>
+          </a:prstGeom>
+        </p:spPr>
+      </p:pic>
+      <p:sp>
+        <p:nvSpPr>
+          <p:cNvPr id="3" name="Oval 2"/>
+          <p:cNvSpPr/>
+          <p:nvPr/>
+        </p:nvSpPr>
+        <p:spPr>
+          <a:xfrm>
+            <a:off x="4107334" y="1363488"/>
+            <a:ext cx="280087" cy="271849"/>
+          </a:xfrm>
+          <a:prstGeom prst="ellipse">
+            <a:avLst/>
+          </a:prstGeom>
+          <a:solidFill>
+            <a:srgbClr val="F5AB0C"/>
+          </a:solidFill>
+          <a:ln>
+            <a:solidFill>
+              <a:schemeClr val="tx1"/>
+            </a:solidFill>
+          </a:ln>
+        </p:spPr>
+        <p:style>
+          <a:lnRef idx="2">
+            <a:schemeClr val="accent1">
+              <a:shade val="50000"/>
+            </a:schemeClr>
+          </a:lnRef>
+          <a:fillRef idx="1">
+            <a:schemeClr val="accent1"/>
+          </a:fillRef>
+          <a:effectRef idx="0">
+            <a:schemeClr val="accent1"/>
+          </a:effectRef>
+          <a:fontRef idx="minor">
+            <a:schemeClr val="lt1"/>
+          </a:fontRef>
+        </p:style>
+        <p:txBody>
+          <a:bodyPr rtlCol="0" anchor="ctr"/>
+          <a:lstStyle/>
+          <a:p>
+            <a:pPr algn="ctr"/>
+            <a:r>
+              <a:rPr lang="en-US" dirty="0" smtClean="0">
+                <a:solidFill>
+                  <a:schemeClr val="tx1"/>
+                </a:solidFill>
+                <a:latin typeface="Franklin Gothic Demi Cond" panose="020B0706030402020204" pitchFamily="34" charset="0"/>
+              </a:rPr>
+              <a:t>1</a:t>
+            </a:r>
+            <a:endParaRPr lang="en-US" dirty="0">
+              <a:solidFill>
+                <a:schemeClr val="tx1"/>
+              </a:solidFill>
+              <a:latin typeface="Franklin Gothic Demi Cond" panose="020B0706030402020204" pitchFamily="34" charset="0"/>
+            </a:endParaRPr>
+          </a:p>
+        </p:txBody>
+      </p:sp>
+      <p:sp>
+        <p:nvSpPr>
+          <p:cNvPr id="4" name="Oval 3"/>
+          <p:cNvSpPr/>
+          <p:nvPr/>
+        </p:nvSpPr>
+        <p:spPr>
+          <a:xfrm>
+            <a:off x="4350351" y="1700596"/>
+            <a:ext cx="280087" cy="271849"/>
+          </a:xfrm>
+          <a:prstGeom prst="ellipse">
+            <a:avLst/>
+          </a:prstGeom>
+          <a:solidFill>
+            <a:srgbClr val="F5AB0C"/>
+          </a:solidFill>
+          <a:ln>
+            <a:solidFill>
+              <a:schemeClr val="tx1"/>
+            </a:solidFill>
+          </a:ln>
+        </p:spPr>
+        <p:style>
+          <a:lnRef idx="2">
+            <a:schemeClr val="accent1">
+              <a:shade val="50000"/>
+            </a:schemeClr>
+          </a:lnRef>
+          <a:fillRef idx="1">
+            <a:schemeClr val="accent1"/>
+          </a:fillRef>
+          <a:effectRef idx="0">
+            <a:schemeClr val="accent1"/>
+          </a:effectRef>
+          <a:fontRef idx="minor">
+            <a:schemeClr val="lt1"/>
+          </a:fontRef>
+        </p:style>
+        <p:txBody>
+          <a:bodyPr rtlCol="0" anchor="ctr"/>
+          <a:lstStyle/>
+          <a:p>
+            <a:pPr algn="ctr"/>
+            <a:r>
+              <a:rPr lang="en-US" dirty="0">
+                <a:solidFill>
+                  <a:schemeClr val="tx1"/>
+                </a:solidFill>
+                <a:latin typeface="Franklin Gothic Demi Cond" panose="020B0706030402020204" pitchFamily="34" charset="0"/>
+              </a:rPr>
+              <a:t>2</a:t>
+            </a:r>
+          </a:p>
+        </p:txBody>
+      </p:sp>
+      <p:sp>
+        <p:nvSpPr>
+          <p:cNvPr id="5" name="Oval 4"/>
+          <p:cNvSpPr/>
+          <p:nvPr/>
+        </p:nvSpPr>
+        <p:spPr>
+          <a:xfrm>
+            <a:off x="3967290" y="2393988"/>
+            <a:ext cx="280087" cy="271849"/>
+          </a:xfrm>
+          <a:prstGeom prst="ellipse">
+            <a:avLst/>
+          </a:prstGeom>
+          <a:solidFill>
+            <a:srgbClr val="F5AB0C"/>
+          </a:solidFill>
+          <a:ln>
+            <a:solidFill>
+              <a:schemeClr val="tx1"/>
+            </a:solidFill>
+          </a:ln>
+        </p:spPr>
+        <p:style>
+          <a:lnRef idx="2">
+            <a:schemeClr val="accent1">
+              <a:shade val="50000"/>
+            </a:schemeClr>
+          </a:lnRef>
+          <a:fillRef idx="1">
+            <a:schemeClr val="accent1"/>
+          </a:fillRef>
+          <a:effectRef idx="0">
+            <a:schemeClr val="accent1"/>
+          </a:effectRef>
+          <a:fontRef idx="minor">
+            <a:schemeClr val="lt1"/>
+          </a:fontRef>
+        </p:style>
+        <p:txBody>
+          <a:bodyPr rtlCol="0" anchor="ctr"/>
+          <a:lstStyle/>
+          <a:p>
+            <a:pPr algn="ctr"/>
+            <a:r>
+              <a:rPr lang="en-US" dirty="0">
+                <a:solidFill>
+                  <a:schemeClr val="tx1"/>
+                </a:solidFill>
+                <a:latin typeface="Franklin Gothic Demi Cond" panose="020B0706030402020204" pitchFamily="34" charset="0"/>
+              </a:rPr>
+              <a:t>3</a:t>
+            </a:r>
+          </a:p>
+        </p:txBody>
+      </p:sp>
+      <p:sp>
+        <p:nvSpPr>
+          <p:cNvPr id="6" name="Oval 5"/>
+          <p:cNvSpPr/>
+          <p:nvPr/>
+        </p:nvSpPr>
+        <p:spPr>
+          <a:xfrm>
+            <a:off x="3827246" y="2817593"/>
+            <a:ext cx="280087" cy="271849"/>
+          </a:xfrm>
+          <a:prstGeom prst="ellipse">
+            <a:avLst/>
+          </a:prstGeom>
+          <a:solidFill>
+            <a:srgbClr val="F5AB0C"/>
+          </a:solidFill>
+          <a:ln>
+            <a:solidFill>
+              <a:schemeClr val="tx1"/>
+            </a:solidFill>
+          </a:ln>
+        </p:spPr>
+        <p:style>
+          <a:lnRef idx="2">
+            <a:schemeClr val="accent1">
+              <a:shade val="50000"/>
+            </a:schemeClr>
+          </a:lnRef>
+          <a:fillRef idx="1">
+            <a:schemeClr val="accent1"/>
+          </a:fillRef>
+          <a:effectRef idx="0">
+            <a:schemeClr val="accent1"/>
+          </a:effectRef>
+          <a:fontRef idx="minor">
+            <a:schemeClr val="lt1"/>
+          </a:fontRef>
+        </p:style>
+        <p:txBody>
+          <a:bodyPr rtlCol="0" anchor="ctr"/>
+          <a:lstStyle/>
+          <a:p>
+            <a:pPr algn="ctr"/>
+            <a:r>
+              <a:rPr lang="en-US" dirty="0" smtClean="0">
+                <a:solidFill>
+                  <a:schemeClr val="tx1"/>
+                </a:solidFill>
+                <a:latin typeface="Franklin Gothic Demi Cond" panose="020B0706030402020204" pitchFamily="34" charset="0"/>
+              </a:rPr>
+              <a:t>4</a:t>
+            </a:r>
+            <a:endParaRPr lang="en-US" dirty="0">
+              <a:solidFill>
+                <a:schemeClr val="tx1"/>
+              </a:solidFill>
+              <a:latin typeface="Franklin Gothic Demi Cond" panose="020B0706030402020204" pitchFamily="34" charset="0"/>
+            </a:endParaRPr>
+          </a:p>
+        </p:txBody>
+      </p:sp>
+      <p:sp>
+        <p:nvSpPr>
+          <p:cNvPr id="7" name="Oval 6"/>
+          <p:cNvSpPr/>
+          <p:nvPr/>
+        </p:nvSpPr>
+        <p:spPr>
+          <a:xfrm>
+            <a:off x="3547159" y="3466068"/>
+            <a:ext cx="280087" cy="271849"/>
+          </a:xfrm>
+          <a:prstGeom prst="ellipse">
+            <a:avLst/>
+          </a:prstGeom>
+          <a:solidFill>
+            <a:srgbClr val="F5AB0C"/>
+          </a:solidFill>
+          <a:ln>
+            <a:solidFill>
+              <a:schemeClr val="tx1"/>
+            </a:solidFill>
+          </a:ln>
+        </p:spPr>
+        <p:style>
+          <a:lnRef idx="2">
+            <a:schemeClr val="accent1">
+              <a:shade val="50000"/>
+            </a:schemeClr>
+          </a:lnRef>
+          <a:fillRef idx="1">
+            <a:schemeClr val="accent1"/>
+          </a:fillRef>
+          <a:effectRef idx="0">
+            <a:schemeClr val="accent1"/>
+          </a:effectRef>
+          <a:fontRef idx="minor">
+            <a:schemeClr val="lt1"/>
+          </a:fontRef>
+        </p:style>
+        <p:txBody>
+          <a:bodyPr rtlCol="0" anchor="ctr"/>
+          <a:lstStyle/>
+          <a:p>
+            <a:pPr algn="ctr"/>
+            <a:r>
+              <a:rPr lang="en-US" dirty="0" smtClean="0">
+                <a:solidFill>
+                  <a:schemeClr val="tx1"/>
+                </a:solidFill>
+                <a:latin typeface="Franklin Gothic Demi Cond" panose="020B0706030402020204" pitchFamily="34" charset="0"/>
+              </a:rPr>
+              <a:t>5</a:t>
+            </a:r>
+            <a:endParaRPr lang="en-US" dirty="0">
+              <a:solidFill>
+                <a:schemeClr val="tx1"/>
+              </a:solidFill>
+              <a:latin typeface="Franklin Gothic Demi Cond" panose="020B0706030402020204" pitchFamily="34" charset="0"/>
+            </a:endParaRPr>
+          </a:p>
+        </p:txBody>
+      </p:sp>
+      <p:sp>
+        <p:nvSpPr>
+          <p:cNvPr id="8" name="Oval 7"/>
+          <p:cNvSpPr/>
+          <p:nvPr/>
+        </p:nvSpPr>
+        <p:spPr>
+          <a:xfrm>
+            <a:off x="3441611" y="3908981"/>
+            <a:ext cx="280087" cy="271849"/>
+          </a:xfrm>
+          <a:prstGeom prst="ellipse">
+            <a:avLst/>
+          </a:prstGeom>
+          <a:solidFill>
+            <a:srgbClr val="F5AB0C"/>
+          </a:solidFill>
+          <a:ln>
+            <a:solidFill>
+              <a:schemeClr val="tx1"/>
+            </a:solidFill>
+          </a:ln>
+        </p:spPr>
+        <p:style>
+          <a:lnRef idx="2">
+            <a:schemeClr val="accent1">
+              <a:shade val="50000"/>
+            </a:schemeClr>
+          </a:lnRef>
+          <a:fillRef idx="1">
+            <a:schemeClr val="accent1"/>
+          </a:fillRef>
+          <a:effectRef idx="0">
+            <a:schemeClr val="accent1"/>
+          </a:effectRef>
+          <a:fontRef idx="minor">
+            <a:schemeClr val="lt1"/>
+          </a:fontRef>
+        </p:style>
+        <p:txBody>
+          <a:bodyPr rtlCol="0" anchor="ctr"/>
+          <a:lstStyle/>
+          <a:p>
+            <a:pPr algn="ctr"/>
+            <a:r>
+              <a:rPr lang="en-US" dirty="0" smtClean="0">
+                <a:solidFill>
+                  <a:schemeClr val="tx1"/>
+                </a:solidFill>
+                <a:latin typeface="Franklin Gothic Demi Cond" panose="020B0706030402020204" pitchFamily="34" charset="0"/>
+              </a:rPr>
+              <a:t>6</a:t>
+            </a:r>
+            <a:endParaRPr lang="en-US" dirty="0">
+              <a:solidFill>
+                <a:schemeClr val="tx1"/>
+              </a:solidFill>
+              <a:latin typeface="Franklin Gothic Demi Cond" panose="020B0706030402020204" pitchFamily="34" charset="0"/>
+            </a:endParaRPr>
+          </a:p>
+        </p:txBody>
+      </p:sp>
+      <p:sp>
+        <p:nvSpPr>
+          <p:cNvPr id="9" name="Oval 8"/>
+          <p:cNvSpPr/>
+          <p:nvPr/>
+        </p:nvSpPr>
+        <p:spPr>
+          <a:xfrm>
+            <a:off x="3551277" y="4351894"/>
+            <a:ext cx="280087" cy="271849"/>
+          </a:xfrm>
+          <a:prstGeom prst="ellipse">
+            <a:avLst/>
+          </a:prstGeom>
+          <a:solidFill>
+            <a:srgbClr val="F5AB0C"/>
+          </a:solidFill>
+          <a:ln>
+            <a:solidFill>
+              <a:schemeClr val="tx1"/>
+            </a:solidFill>
+          </a:ln>
+        </p:spPr>
+        <p:style>
+          <a:lnRef idx="2">
+            <a:schemeClr val="accent1">
+              <a:shade val="50000"/>
+            </a:schemeClr>
+          </a:lnRef>
+          <a:fillRef idx="1">
+            <a:schemeClr val="accent1"/>
+          </a:fillRef>
+          <a:effectRef idx="0">
+            <a:schemeClr val="accent1"/>
+          </a:effectRef>
+          <a:fontRef idx="minor">
+            <a:schemeClr val="lt1"/>
+          </a:fontRef>
+        </p:style>
+        <p:txBody>
+          <a:bodyPr rtlCol="0" anchor="ctr"/>
+          <a:lstStyle/>
+          <a:p>
+            <a:pPr algn="ctr"/>
+            <a:r>
+              <a:rPr lang="en-US" dirty="0" smtClean="0">
+                <a:solidFill>
+                  <a:schemeClr val="tx1"/>
+                </a:solidFill>
+                <a:latin typeface="Franklin Gothic Demi Cond" panose="020B0706030402020204" pitchFamily="34" charset="0"/>
+              </a:rPr>
+              <a:t>7</a:t>
+            </a:r>
+            <a:endParaRPr lang="en-US" dirty="0">
+              <a:solidFill>
+                <a:schemeClr val="tx1"/>
+              </a:solidFill>
+              <a:latin typeface="Franklin Gothic Demi Cond" panose="020B0706030402020204" pitchFamily="34" charset="0"/>
+            </a:endParaRPr>
+          </a:p>
+        </p:txBody>
+      </p:sp>
+      <p:sp>
+        <p:nvSpPr>
+          <p:cNvPr id="17" name="Oval 16"/>
+          <p:cNvSpPr/>
+          <p:nvPr/>
+        </p:nvSpPr>
+        <p:spPr>
+          <a:xfrm>
+            <a:off x="3516521" y="4859615"/>
+            <a:ext cx="280087" cy="271849"/>
+          </a:xfrm>
+          <a:prstGeom prst="ellipse">
+            <a:avLst/>
+          </a:prstGeom>
+          <a:solidFill>
+            <a:srgbClr val="F5AB0C"/>
+          </a:solidFill>
+          <a:ln>
+            <a:solidFill>
+              <a:schemeClr val="tx1"/>
+            </a:solidFill>
+          </a:ln>
+        </p:spPr>
+        <p:style>
+          <a:lnRef idx="2">
+            <a:schemeClr val="accent1">
+              <a:shade val="50000"/>
+            </a:schemeClr>
+          </a:lnRef>
+          <a:fillRef idx="1">
+            <a:schemeClr val="accent1"/>
+          </a:fillRef>
+          <a:effectRef idx="0">
+            <a:schemeClr val="accent1"/>
+          </a:effectRef>
+          <a:fontRef idx="minor">
+            <a:schemeClr val="lt1"/>
+          </a:fontRef>
+        </p:style>
+        <p:txBody>
+          <a:bodyPr rtlCol="0" anchor="ctr"/>
+          <a:lstStyle/>
+          <a:p>
+            <a:pPr algn="ctr"/>
+            <a:r>
+              <a:rPr lang="en-US" dirty="0" smtClean="0">
+                <a:solidFill>
+                  <a:schemeClr val="tx1"/>
+                </a:solidFill>
+                <a:latin typeface="Franklin Gothic Demi Cond" panose="020B0706030402020204" pitchFamily="34" charset="0"/>
+              </a:rPr>
+              <a:t>8</a:t>
+            </a:r>
+            <a:endParaRPr lang="en-US" dirty="0">
+              <a:solidFill>
+                <a:schemeClr val="tx1"/>
+              </a:solidFill>
+              <a:latin typeface="Franklin Gothic Demi Cond" panose="020B0706030402020204" pitchFamily="34" charset="0"/>
+            </a:endParaRPr>
+          </a:p>
+        </p:txBody>
+      </p:sp>
+      <p:sp>
+        <p:nvSpPr>
+          <p:cNvPr id="18" name="Oval 17"/>
+          <p:cNvSpPr/>
+          <p:nvPr/>
+        </p:nvSpPr>
+        <p:spPr>
+          <a:xfrm>
+            <a:off x="9415849" y="750022"/>
+            <a:ext cx="280087" cy="271849"/>
+          </a:xfrm>
+          <a:prstGeom prst="ellipse">
+            <a:avLst/>
+          </a:prstGeom>
+          <a:solidFill>
+            <a:srgbClr val="F5AB0C"/>
+          </a:solidFill>
+          <a:ln>
+            <a:solidFill>
+              <a:schemeClr val="tx1"/>
+            </a:solidFill>
+          </a:ln>
+        </p:spPr>
+        <p:style>
+          <a:lnRef idx="2">
+            <a:schemeClr val="accent1">
+              <a:shade val="50000"/>
+            </a:schemeClr>
+          </a:lnRef>
+          <a:fillRef idx="1">
+            <a:schemeClr val="accent1"/>
+          </a:fillRef>
+          <a:effectRef idx="0">
+            <a:schemeClr val="accent1"/>
+          </a:effectRef>
+          <a:fontRef idx="minor">
+            <a:schemeClr val="lt1"/>
+          </a:fontRef>
+        </p:style>
+        <p:txBody>
+          <a:bodyPr rtlCol="0" anchor="ctr"/>
+          <a:lstStyle/>
+          <a:p>
+            <a:pPr algn="ctr"/>
+            <a:r>
+              <a:rPr lang="en-US" dirty="0">
+                <a:solidFill>
+                  <a:schemeClr val="tx1"/>
+                </a:solidFill>
+                <a:latin typeface="Franklin Gothic Demi Cond" panose="020B0706030402020204" pitchFamily="34" charset="0"/>
+              </a:rPr>
+              <a:t>9</a:t>
+            </a:r>
+            <a:endParaRPr lang="en-US" dirty="0">
+              <a:solidFill>
+                <a:schemeClr val="tx1"/>
+              </a:solidFill>
+              <a:latin typeface="Franklin Gothic Demi Cond" panose="020B0706030402020204" pitchFamily="34" charset="0"/>
+            </a:endParaRPr>
+          </a:p>
+        </p:txBody>
+      </p:sp>
+    </p:spTree>
+    <p:extLst>
+      <p:ext uri="{BB962C8B-B14F-4D97-AF65-F5344CB8AC3E}">
+        <p14:creationId xmlns:p14="http://schemas.microsoft.com/office/powerpoint/2010/main" val="2909160177"/>
+      </p:ext>
+    </p:extLst>
+  </p:cSld>
+  <p:clrMapOvr>
+    <a:masterClrMapping/>
+  </p:clrMapOvr>
+</p:sld>
+</file>
+
+<file path=ppt/slides/slide9.xml><?xml version="1.0" encoding="utf-8"?>
+<p:sld xmlns:a="http://schemas.openxmlformats.org/drawingml/2006/main" xmlns:r="http://schemas.openxmlformats.org/officeDocument/2006/relationships" xmlns:p="http://schemas.openxmlformats.org/presentationml/2006/main">
+  <p:cSld>
+    <p:spTree>
+      <p:nvGrpSpPr>
+        <p:cNvPr id="1" name=""/>
+        <p:cNvGrpSpPr/>
+        <p:nvPr/>
+      </p:nvGrpSpPr>
+      <p:grpSpPr>
+        <a:xfrm>
+          <a:off x="0" y="0"/>
+          <a:ext cx="0" cy="0"/>
+          <a:chOff x="0" y="0"/>
+          <a:chExt cx="0" cy="0"/>
+        </a:xfrm>
+      </p:grpSpPr>
+      <p:pic>
+        <p:nvPicPr>
+          <p:cNvPr id="2" name="Picture 1"/>
+          <p:cNvPicPr>
+            <a:picLocks noChangeAspect="1"/>
+          </p:cNvPicPr>
+          <p:nvPr/>
+        </p:nvPicPr>
+        <p:blipFill>
+          <a:blip r:embed="rId2"/>
+          <a:stretch>
+            <a:fillRect/>
+          </a:stretch>
+        </p:blipFill>
+        <p:spPr>
+          <a:xfrm>
+            <a:off x="2262187" y="1009650"/>
+            <a:ext cx="7667625" cy="4838700"/>
+          </a:xfrm>
+          <a:prstGeom prst="rect">
+            <a:avLst/>
+          </a:prstGeom>
+        </p:spPr>
+      </p:pic>
+      <p:sp>
+        <p:nvSpPr>
+          <p:cNvPr id="3" name="Oval 2"/>
+          <p:cNvSpPr/>
+          <p:nvPr/>
+        </p:nvSpPr>
+        <p:spPr>
+          <a:xfrm>
+            <a:off x="3441610" y="1009650"/>
+            <a:ext cx="280087" cy="271849"/>
+          </a:xfrm>
+          <a:prstGeom prst="ellipse">
+            <a:avLst/>
+          </a:prstGeom>
+          <a:solidFill>
+            <a:srgbClr val="F5AB0C"/>
+          </a:solidFill>
+          <a:ln>
+            <a:solidFill>
+              <a:schemeClr val="tx1"/>
+            </a:solidFill>
+          </a:ln>
+        </p:spPr>
+        <p:style>
+          <a:lnRef idx="2">
+            <a:schemeClr val="accent1">
+              <a:shade val="50000"/>
+            </a:schemeClr>
+          </a:lnRef>
+          <a:fillRef idx="1">
+            <a:schemeClr val="accent1"/>
+          </a:fillRef>
+          <a:effectRef idx="0">
+            <a:schemeClr val="accent1"/>
+          </a:effectRef>
+          <a:fontRef idx="minor">
+            <a:schemeClr val="lt1"/>
+          </a:fontRef>
+        </p:style>
+        <p:txBody>
+          <a:bodyPr rtlCol="0" anchor="ctr"/>
+          <a:lstStyle/>
+          <a:p>
+            <a:pPr algn="ctr"/>
+            <a:r>
+              <a:rPr lang="en-US" dirty="0" smtClean="0">
+                <a:solidFill>
+                  <a:schemeClr val="tx1"/>
+                </a:solidFill>
+                <a:latin typeface="Franklin Gothic Demi Cond" panose="020B0706030402020204" pitchFamily="34" charset="0"/>
+              </a:rPr>
+              <a:t>1</a:t>
+            </a:r>
+            <a:endParaRPr lang="en-US" dirty="0">
+              <a:solidFill>
+                <a:schemeClr val="tx1"/>
+              </a:solidFill>
+              <a:latin typeface="Franklin Gothic Demi Cond" panose="020B0706030402020204" pitchFamily="34" charset="0"/>
+            </a:endParaRPr>
+          </a:p>
+        </p:txBody>
+      </p:sp>
+      <p:sp>
+        <p:nvSpPr>
+          <p:cNvPr id="4" name="Oval 3"/>
+          <p:cNvSpPr/>
+          <p:nvPr/>
+        </p:nvSpPr>
+        <p:spPr>
+          <a:xfrm>
+            <a:off x="4498630" y="1541126"/>
+            <a:ext cx="280087" cy="271849"/>
+          </a:xfrm>
+          <a:prstGeom prst="ellipse">
+            <a:avLst/>
+          </a:prstGeom>
+          <a:solidFill>
+            <a:srgbClr val="F5AB0C"/>
+          </a:solidFill>
+          <a:ln>
+            <a:solidFill>
+              <a:schemeClr val="tx1"/>
+            </a:solidFill>
+          </a:ln>
+        </p:spPr>
+        <p:style>
+          <a:lnRef idx="2">
+            <a:schemeClr val="accent1">
+              <a:shade val="50000"/>
+            </a:schemeClr>
+          </a:lnRef>
+          <a:fillRef idx="1">
+            <a:schemeClr val="accent1"/>
+          </a:fillRef>
+          <a:effectRef idx="0">
+            <a:schemeClr val="accent1"/>
+          </a:effectRef>
+          <a:fontRef idx="minor">
+            <a:schemeClr val="lt1"/>
+          </a:fontRef>
+        </p:style>
+        <p:txBody>
+          <a:bodyPr rtlCol="0" anchor="ctr"/>
+          <a:lstStyle/>
+          <a:p>
+            <a:pPr algn="ctr"/>
+            <a:r>
+              <a:rPr lang="en-US" dirty="0">
+                <a:solidFill>
+                  <a:schemeClr val="tx1"/>
+                </a:solidFill>
+                <a:latin typeface="Franklin Gothic Demi Cond" panose="020B0706030402020204" pitchFamily="34" charset="0"/>
+              </a:rPr>
+              <a:t>2</a:t>
+            </a:r>
+            <a:endParaRPr lang="en-US" dirty="0">
+              <a:solidFill>
+                <a:schemeClr val="tx1"/>
+              </a:solidFill>
+              <a:latin typeface="Franklin Gothic Demi Cond" panose="020B0706030402020204" pitchFamily="34" charset="0"/>
+            </a:endParaRPr>
+          </a:p>
+        </p:txBody>
+      </p:sp>
+      <p:sp>
+        <p:nvSpPr>
+          <p:cNvPr id="5" name="Oval 4"/>
+          <p:cNvSpPr/>
+          <p:nvPr/>
+        </p:nvSpPr>
+        <p:spPr>
+          <a:xfrm>
+            <a:off x="8975894" y="1541126"/>
+            <a:ext cx="280087" cy="271849"/>
+          </a:xfrm>
+          <a:prstGeom prst="ellipse">
+            <a:avLst/>
+          </a:prstGeom>
+          <a:solidFill>
+            <a:srgbClr val="F5AB0C"/>
+          </a:solidFill>
+          <a:ln>
+            <a:solidFill>
+              <a:schemeClr val="tx1"/>
+            </a:solidFill>
+          </a:ln>
+        </p:spPr>
+        <p:style>
+          <a:lnRef idx="2">
+            <a:schemeClr val="accent1">
+              <a:shade val="50000"/>
+            </a:schemeClr>
+          </a:lnRef>
+          <a:fillRef idx="1">
+            <a:schemeClr val="accent1"/>
+          </a:fillRef>
+          <a:effectRef idx="0">
+            <a:schemeClr val="accent1"/>
+          </a:effectRef>
+          <a:fontRef idx="minor">
+            <a:schemeClr val="lt1"/>
+          </a:fontRef>
+        </p:style>
+        <p:txBody>
+          <a:bodyPr rtlCol="0" anchor="ctr"/>
+          <a:lstStyle/>
+          <a:p>
+            <a:pPr algn="ctr"/>
+            <a:r>
+              <a:rPr lang="en-US" dirty="0">
+                <a:solidFill>
+                  <a:schemeClr val="tx1"/>
+                </a:solidFill>
+                <a:latin typeface="Franklin Gothic Demi Cond" panose="020B0706030402020204" pitchFamily="34" charset="0"/>
+              </a:rPr>
+              <a:t>3</a:t>
+            </a:r>
+            <a:endParaRPr lang="en-US" dirty="0">
+              <a:solidFill>
+                <a:schemeClr val="tx1"/>
+              </a:solidFill>
+              <a:latin typeface="Franklin Gothic Demi Cond" panose="020B0706030402020204" pitchFamily="34" charset="0"/>
+            </a:endParaRPr>
+          </a:p>
+        </p:txBody>
+      </p:sp>
+      <p:sp>
+        <p:nvSpPr>
+          <p:cNvPr id="6" name="Oval 5"/>
+          <p:cNvSpPr/>
+          <p:nvPr/>
+        </p:nvSpPr>
+        <p:spPr>
+          <a:xfrm>
+            <a:off x="9221224" y="2072602"/>
+            <a:ext cx="280087" cy="271849"/>
+          </a:xfrm>
+          <a:prstGeom prst="ellipse">
+            <a:avLst/>
+          </a:prstGeom>
+          <a:solidFill>
+            <a:srgbClr val="F5AB0C"/>
+          </a:solidFill>
+          <a:ln>
+            <a:solidFill>
+              <a:schemeClr val="tx1"/>
+            </a:solidFill>
+          </a:ln>
+        </p:spPr>
+        <p:style>
+          <a:lnRef idx="2">
+            <a:schemeClr val="accent1">
+              <a:shade val="50000"/>
+            </a:schemeClr>
+          </a:lnRef>
+          <a:fillRef idx="1">
+            <a:schemeClr val="accent1"/>
+          </a:fillRef>
+          <a:effectRef idx="0">
+            <a:schemeClr val="accent1"/>
+          </a:effectRef>
+          <a:fontRef idx="minor">
+            <a:schemeClr val="lt1"/>
+          </a:fontRef>
+        </p:style>
+        <p:txBody>
+          <a:bodyPr rtlCol="0" anchor="ctr"/>
+          <a:lstStyle/>
+          <a:p>
+            <a:pPr algn="ctr"/>
+            <a:r>
+              <a:rPr lang="en-US" dirty="0">
+                <a:solidFill>
+                  <a:schemeClr val="tx1"/>
+                </a:solidFill>
+                <a:latin typeface="Franklin Gothic Demi Cond" panose="020B0706030402020204" pitchFamily="34" charset="0"/>
+              </a:rPr>
+              <a:t>4</a:t>
+            </a:r>
+            <a:endParaRPr lang="en-US" dirty="0">
+              <a:solidFill>
+                <a:schemeClr val="tx1"/>
+              </a:solidFill>
+              <a:latin typeface="Franklin Gothic Demi Cond" panose="020B0706030402020204" pitchFamily="34" charset="0"/>
+            </a:endParaRPr>
+          </a:p>
+        </p:txBody>
+      </p:sp>
+      <p:sp>
+        <p:nvSpPr>
+          <p:cNvPr id="7" name="Oval 6"/>
+          <p:cNvSpPr/>
+          <p:nvPr/>
+        </p:nvSpPr>
+        <p:spPr>
+          <a:xfrm>
+            <a:off x="3550241" y="5231411"/>
+            <a:ext cx="280087" cy="271849"/>
+          </a:xfrm>
+          <a:prstGeom prst="ellipse">
+            <a:avLst/>
+          </a:prstGeom>
+          <a:solidFill>
+            <a:srgbClr val="F5AB0C"/>
+          </a:solidFill>
+          <a:ln>
+            <a:solidFill>
+              <a:schemeClr val="tx1"/>
+            </a:solidFill>
+          </a:ln>
+        </p:spPr>
+        <p:style>
+          <a:lnRef idx="2">
+            <a:schemeClr val="accent1">
+              <a:shade val="50000"/>
+            </a:schemeClr>
+          </a:lnRef>
+          <a:fillRef idx="1">
+            <a:schemeClr val="accent1"/>
+          </a:fillRef>
+          <a:effectRef idx="0">
+            <a:schemeClr val="accent1"/>
+          </a:effectRef>
+          <a:fontRef idx="minor">
+            <a:schemeClr val="lt1"/>
+          </a:fontRef>
+        </p:style>
+        <p:txBody>
+          <a:bodyPr rtlCol="0" anchor="ctr"/>
+          <a:lstStyle/>
+          <a:p>
+            <a:pPr algn="ctr"/>
+            <a:r>
+              <a:rPr lang="en-US" dirty="0">
+                <a:solidFill>
+                  <a:schemeClr val="tx1"/>
+                </a:solidFill>
+                <a:latin typeface="Franklin Gothic Demi Cond" panose="020B0706030402020204" pitchFamily="34" charset="0"/>
+              </a:rPr>
+              <a:t>5</a:t>
+            </a:r>
+            <a:endParaRPr lang="en-US" dirty="0">
+              <a:solidFill>
+                <a:schemeClr val="tx1"/>
+              </a:solidFill>
+              <a:latin typeface="Franklin Gothic Demi Cond" panose="020B0706030402020204" pitchFamily="34" charset="0"/>
+            </a:endParaRPr>
+          </a:p>
+        </p:txBody>
+      </p:sp>
+      <p:sp>
+        <p:nvSpPr>
+          <p:cNvPr id="12" name="Oval 11"/>
+          <p:cNvSpPr/>
+          <p:nvPr/>
+        </p:nvSpPr>
+        <p:spPr>
+          <a:xfrm>
+            <a:off x="4358586" y="5231410"/>
+            <a:ext cx="280087" cy="271849"/>
+          </a:xfrm>
+          <a:prstGeom prst="ellipse">
+            <a:avLst/>
+          </a:prstGeom>
+          <a:solidFill>
+            <a:srgbClr val="F5AB0C"/>
+          </a:solidFill>
+          <a:ln>
+            <a:solidFill>
+              <a:schemeClr val="tx1"/>
+            </a:solidFill>
+          </a:ln>
+        </p:spPr>
+        <p:style>
+          <a:lnRef idx="2">
+            <a:schemeClr val="accent1">
+              <a:shade val="50000"/>
+            </a:schemeClr>
+          </a:lnRef>
+          <a:fillRef idx="1">
+            <a:schemeClr val="accent1"/>
+          </a:fillRef>
+          <a:effectRef idx="0">
+            <a:schemeClr val="accent1"/>
+          </a:effectRef>
+          <a:fontRef idx="minor">
+            <a:schemeClr val="lt1"/>
+          </a:fontRef>
+        </p:style>
+        <p:txBody>
+          <a:bodyPr rtlCol="0" anchor="ctr"/>
+          <a:lstStyle/>
+          <a:p>
+            <a:pPr algn="ctr"/>
+            <a:r>
+              <a:rPr lang="en-US" dirty="0">
+                <a:solidFill>
+                  <a:schemeClr val="tx1"/>
+                </a:solidFill>
+                <a:latin typeface="Franklin Gothic Demi Cond" panose="020B0706030402020204" pitchFamily="34" charset="0"/>
+              </a:rPr>
+              <a:t>6</a:t>
+            </a:r>
+          </a:p>
+        </p:txBody>
+      </p:sp>
+    </p:spTree>
+    <p:extLst>
+      <p:ext uri="{BB962C8B-B14F-4D97-AF65-F5344CB8AC3E}">
+        <p14:creationId xmlns:p14="http://schemas.microsoft.com/office/powerpoint/2010/main" val="1434234904"/>
       </p:ext>
     </p:extLst>
   </p:cSld>

</xml_diff>

<commit_message>
User Manual Done Starting Quick Start and Overview
</commit_message>
<xml_diff>
--- a/docsProject/IntentUserManualImages.pptx
+++ b/docsProject/IntentUserManualImages.pptx
@@ -24,6 +24,8 @@
     <p:sldId id="269" r:id="rId18"/>
     <p:sldId id="268" r:id="rId19"/>
     <p:sldId id="274" r:id="rId20"/>
+    <p:sldId id="275" r:id="rId21"/>
+    <p:sldId id="276" r:id="rId22"/>
   </p:sldIdLst>
   <p:sldSz cx="12192000" cy="6858000"/>
   <p:notesSz cx="6858000" cy="9144000"/>
@@ -261,7 +263,7 @@
           <a:p>
             <a:fld id="{1461CAAB-CD95-4EF5-8A41-73166CBFBDC9}" type="datetimeFigureOut">
               <a:rPr lang="en-US" smtClean="0"/>
-              <a:t>9/18/2017</a:t>
+              <a:t>9/19/2017</a:t>
             </a:fld>
             <a:endParaRPr lang="en-US"/>
           </a:p>
@@ -431,7 +433,7 @@
           <a:p>
             <a:fld id="{1461CAAB-CD95-4EF5-8A41-73166CBFBDC9}" type="datetimeFigureOut">
               <a:rPr lang="en-US" smtClean="0"/>
-              <a:t>9/18/2017</a:t>
+              <a:t>9/19/2017</a:t>
             </a:fld>
             <a:endParaRPr lang="en-US"/>
           </a:p>
@@ -611,7 +613,7 @@
           <a:p>
             <a:fld id="{1461CAAB-CD95-4EF5-8A41-73166CBFBDC9}" type="datetimeFigureOut">
               <a:rPr lang="en-US" smtClean="0"/>
-              <a:t>9/18/2017</a:t>
+              <a:t>9/19/2017</a:t>
             </a:fld>
             <a:endParaRPr lang="en-US"/>
           </a:p>
@@ -781,7 +783,7 @@
           <a:p>
             <a:fld id="{1461CAAB-CD95-4EF5-8A41-73166CBFBDC9}" type="datetimeFigureOut">
               <a:rPr lang="en-US" smtClean="0"/>
-              <a:t>9/18/2017</a:t>
+              <a:t>9/19/2017</a:t>
             </a:fld>
             <a:endParaRPr lang="en-US"/>
           </a:p>
@@ -1027,7 +1029,7 @@
           <a:p>
             <a:fld id="{1461CAAB-CD95-4EF5-8A41-73166CBFBDC9}" type="datetimeFigureOut">
               <a:rPr lang="en-US" smtClean="0"/>
-              <a:t>9/18/2017</a:t>
+              <a:t>9/19/2017</a:t>
             </a:fld>
             <a:endParaRPr lang="en-US"/>
           </a:p>
@@ -1259,7 +1261,7 @@
           <a:p>
             <a:fld id="{1461CAAB-CD95-4EF5-8A41-73166CBFBDC9}" type="datetimeFigureOut">
               <a:rPr lang="en-US" smtClean="0"/>
-              <a:t>9/18/2017</a:t>
+              <a:t>9/19/2017</a:t>
             </a:fld>
             <a:endParaRPr lang="en-US"/>
           </a:p>
@@ -1626,7 +1628,7 @@
           <a:p>
             <a:fld id="{1461CAAB-CD95-4EF5-8A41-73166CBFBDC9}" type="datetimeFigureOut">
               <a:rPr lang="en-US" smtClean="0"/>
-              <a:t>9/18/2017</a:t>
+              <a:t>9/19/2017</a:t>
             </a:fld>
             <a:endParaRPr lang="en-US"/>
           </a:p>
@@ -1744,7 +1746,7 @@
           <a:p>
             <a:fld id="{1461CAAB-CD95-4EF5-8A41-73166CBFBDC9}" type="datetimeFigureOut">
               <a:rPr lang="en-US" smtClean="0"/>
-              <a:t>9/18/2017</a:t>
+              <a:t>9/19/2017</a:t>
             </a:fld>
             <a:endParaRPr lang="en-US"/>
           </a:p>
@@ -1839,7 +1841,7 @@
           <a:p>
             <a:fld id="{1461CAAB-CD95-4EF5-8A41-73166CBFBDC9}" type="datetimeFigureOut">
               <a:rPr lang="en-US" smtClean="0"/>
-              <a:t>9/18/2017</a:t>
+              <a:t>9/19/2017</a:t>
             </a:fld>
             <a:endParaRPr lang="en-US"/>
           </a:p>
@@ -2116,7 +2118,7 @@
           <a:p>
             <a:fld id="{1461CAAB-CD95-4EF5-8A41-73166CBFBDC9}" type="datetimeFigureOut">
               <a:rPr lang="en-US" smtClean="0"/>
-              <a:t>9/18/2017</a:t>
+              <a:t>9/19/2017</a:t>
             </a:fld>
             <a:endParaRPr lang="en-US"/>
           </a:p>
@@ -2369,7 +2371,7 @@
           <a:p>
             <a:fld id="{1461CAAB-CD95-4EF5-8A41-73166CBFBDC9}" type="datetimeFigureOut">
               <a:rPr lang="en-US" smtClean="0"/>
-              <a:t>9/18/2017</a:t>
+              <a:t>9/19/2017</a:t>
             </a:fld>
             <a:endParaRPr lang="en-US"/>
           </a:p>
@@ -2582,7 +2584,7 @@
           <a:p>
             <a:fld id="{1461CAAB-CD95-4EF5-8A41-73166CBFBDC9}" type="datetimeFigureOut">
               <a:rPr lang="en-US" smtClean="0"/>
-              <a:t>9/18/2017</a:t>
+              <a:t>9/19/2017</a:t>
             </a:fld>
             <a:endParaRPr lang="en-US"/>
           </a:p>
@@ -4230,12 +4232,6 @@
               </a:rPr>
               <a:t>4</a:t>
             </a:r>
-            <a:endParaRPr lang="en-US" dirty="0">
-              <a:solidFill>
-                <a:schemeClr val="tx1"/>
-              </a:solidFill>
-              <a:latin typeface="Franklin Gothic Demi Cond" panose="020B0706030402020204" pitchFamily="34" charset="0"/>
-            </a:endParaRPr>
           </a:p>
         </p:txBody>
       </p:sp>
@@ -4348,12 +4344,6 @@
               </a:rPr>
               <a:t>7</a:t>
             </a:r>
-            <a:endParaRPr lang="en-US" dirty="0">
-              <a:solidFill>
-                <a:schemeClr val="tx1"/>
-              </a:solidFill>
-              <a:latin typeface="Franklin Gothic Demi Cond" panose="020B0706030402020204" pitchFamily="34" charset="0"/>
-            </a:endParaRPr>
           </a:p>
         </p:txBody>
       </p:sp>
@@ -4806,12 +4796,6 @@
               </a:rPr>
               <a:t>4</a:t>
             </a:r>
-            <a:endParaRPr lang="en-US" dirty="0">
-              <a:solidFill>
-                <a:schemeClr val="tx1"/>
-              </a:solidFill>
-              <a:latin typeface="Franklin Gothic Demi Cond" panose="020B0706030402020204" pitchFamily="34" charset="0"/>
-            </a:endParaRPr>
           </a:p>
         </p:txBody>
       </p:sp>
@@ -5150,12 +5134,6 @@
               </a:rPr>
               <a:t>4</a:t>
             </a:r>
-            <a:endParaRPr lang="en-US" dirty="0">
-              <a:solidFill>
-                <a:schemeClr val="tx1"/>
-              </a:solidFill>
-              <a:latin typeface="Franklin Gothic Demi Cond" panose="020B0706030402020204" pitchFamily="34" charset="0"/>
-            </a:endParaRPr>
           </a:p>
         </p:txBody>
       </p:sp>
@@ -5804,12 +5782,6 @@
               </a:rPr>
               <a:t>4</a:t>
             </a:r>
-            <a:endParaRPr lang="en-US" dirty="0">
-              <a:solidFill>
-                <a:schemeClr val="tx1"/>
-              </a:solidFill>
-              <a:latin typeface="Franklin Gothic Demi Cond" panose="020B0706030402020204" pitchFamily="34" charset="0"/>
-            </a:endParaRPr>
           </a:p>
         </p:txBody>
       </p:sp>
@@ -6094,12 +6066,6 @@
               </a:rPr>
               <a:t>4</a:t>
             </a:r>
-            <a:endParaRPr lang="en-US" dirty="0">
-              <a:solidFill>
-                <a:schemeClr val="tx1"/>
-              </a:solidFill>
-              <a:latin typeface="Franklin Gothic Demi Cond" panose="020B0706030402020204" pitchFamily="34" charset="0"/>
-            </a:endParaRPr>
           </a:p>
         </p:txBody>
       </p:sp>
@@ -6189,6 +6155,30 @@
           <a:chExt cx="0" cy="0"/>
         </a:xfrm>
       </p:grpSpPr>
+      <p:pic>
+        <p:nvPicPr>
+          <p:cNvPr id="2" name="Picture 1"/>
+          <p:cNvPicPr>
+            <a:picLocks noChangeAspect="1"/>
+          </p:cNvPicPr>
+          <p:nvPr/>
+        </p:nvPicPr>
+        <p:blipFill>
+          <a:blip r:embed="rId2"/>
+          <a:stretch>
+            <a:fillRect/>
+          </a:stretch>
+        </p:blipFill>
+        <p:spPr>
+          <a:xfrm>
+            <a:off x="1495296" y="308275"/>
+            <a:ext cx="7800975" cy="5648325"/>
+          </a:xfrm>
+          <a:prstGeom prst="rect">
+            <a:avLst/>
+          </a:prstGeom>
+        </p:spPr>
+      </p:pic>
       <p:sp>
         <p:nvSpPr>
           <p:cNvPr id="3" name="Oval 2"/>
@@ -6197,7 +6187,7 @@
         </p:nvSpPr>
         <p:spPr>
           <a:xfrm>
-            <a:off x="5962641" y="1914525"/>
+            <a:off x="2634555" y="1033076"/>
             <a:ext cx="280087" cy="271849"/>
           </a:xfrm>
           <a:prstGeom prst="ellipse">
@@ -6259,7 +6249,7 @@
         </p:nvSpPr>
         <p:spPr>
           <a:xfrm>
-            <a:off x="6578399" y="2050449"/>
+            <a:off x="3711632" y="1597368"/>
             <a:ext cx="280087" cy="271849"/>
           </a:xfrm>
           <a:prstGeom prst="ellipse">
@@ -6315,7 +6305,7 @@
         </p:nvSpPr>
         <p:spPr>
           <a:xfrm>
-            <a:off x="5815913" y="2352421"/>
+            <a:off x="5049794" y="1808724"/>
             <a:ext cx="280087" cy="271849"/>
           </a:xfrm>
           <a:prstGeom prst="ellipse">
@@ -6371,7 +6361,7 @@
         </p:nvSpPr>
         <p:spPr>
           <a:xfrm>
-            <a:off x="5854247" y="2654392"/>
+            <a:off x="5255739" y="2080573"/>
             <a:ext cx="280087" cy="271849"/>
           </a:xfrm>
           <a:prstGeom prst="ellipse">
@@ -6416,12 +6406,6 @@
               </a:rPr>
               <a:t>4</a:t>
             </a:r>
-            <a:endParaRPr lang="en-US" dirty="0">
-              <a:solidFill>
-                <a:schemeClr val="tx1"/>
-              </a:solidFill>
-              <a:latin typeface="Franklin Gothic Demi Cond" panose="020B0706030402020204" pitchFamily="34" charset="0"/>
-            </a:endParaRPr>
           </a:p>
         </p:txBody>
       </p:sp>
@@ -6433,7 +6417,7 @@
         </p:nvSpPr>
         <p:spPr>
           <a:xfrm>
-            <a:off x="5648288" y="3304664"/>
+            <a:off x="3799379" y="4046070"/>
             <a:ext cx="280087" cy="271849"/>
           </a:xfrm>
           <a:prstGeom prst="ellipse">
@@ -6489,7 +6473,7 @@
         </p:nvSpPr>
         <p:spPr>
           <a:xfrm>
-            <a:off x="6298312" y="3361037"/>
+            <a:off x="8868517" y="1243912"/>
             <a:ext cx="280087" cy="271849"/>
           </a:xfrm>
           <a:prstGeom prst="ellipse">
@@ -7017,6 +7001,836 @@
     <p:extLst>
       <p:ext uri="{BB962C8B-B14F-4D97-AF65-F5344CB8AC3E}">
         <p14:creationId xmlns:p14="http://schemas.microsoft.com/office/powerpoint/2010/main" val="4159065185"/>
+      </p:ext>
+    </p:extLst>
+  </p:cSld>
+  <p:clrMapOvr>
+    <a:masterClrMapping/>
+  </p:clrMapOvr>
+</p:sld>
+</file>
+
+<file path=ppt/slides/slide20.xml><?xml version="1.0" encoding="utf-8"?>
+<p:sld xmlns:a="http://schemas.openxmlformats.org/drawingml/2006/main" xmlns:r="http://schemas.openxmlformats.org/officeDocument/2006/relationships" xmlns:p="http://schemas.openxmlformats.org/presentationml/2006/main">
+  <p:cSld>
+    <p:spTree>
+      <p:nvGrpSpPr>
+        <p:cNvPr id="1" name=""/>
+        <p:cNvGrpSpPr/>
+        <p:nvPr/>
+      </p:nvGrpSpPr>
+      <p:grpSpPr>
+        <a:xfrm>
+          <a:off x="0" y="0"/>
+          <a:ext cx="0" cy="0"/>
+          <a:chOff x="0" y="0"/>
+          <a:chExt cx="0" cy="0"/>
+        </a:xfrm>
+      </p:grpSpPr>
+      <p:pic>
+        <p:nvPicPr>
+          <p:cNvPr id="9" name="Picture 8"/>
+          <p:cNvPicPr>
+            <a:picLocks noChangeAspect="1"/>
+          </p:cNvPicPr>
+          <p:nvPr/>
+        </p:nvPicPr>
+        <p:blipFill>
+          <a:blip r:embed="rId2"/>
+          <a:stretch>
+            <a:fillRect/>
+          </a:stretch>
+        </p:blipFill>
+        <p:spPr>
+          <a:xfrm>
+            <a:off x="1866900" y="1471612"/>
+            <a:ext cx="8458200" cy="3914775"/>
+          </a:xfrm>
+          <a:prstGeom prst="rect">
+            <a:avLst/>
+          </a:prstGeom>
+        </p:spPr>
+      </p:pic>
+      <p:sp>
+        <p:nvSpPr>
+          <p:cNvPr id="3" name="Oval 2"/>
+          <p:cNvSpPr/>
+          <p:nvPr/>
+        </p:nvSpPr>
+        <p:spPr>
+          <a:xfrm>
+            <a:off x="3111785" y="2186373"/>
+            <a:ext cx="280087" cy="271849"/>
+          </a:xfrm>
+          <a:prstGeom prst="ellipse">
+            <a:avLst/>
+          </a:prstGeom>
+          <a:solidFill>
+            <a:srgbClr val="F5AB0C"/>
+          </a:solidFill>
+          <a:ln>
+            <a:solidFill>
+              <a:schemeClr val="tx1"/>
+            </a:solidFill>
+          </a:ln>
+        </p:spPr>
+        <p:style>
+          <a:lnRef idx="2">
+            <a:schemeClr val="accent1">
+              <a:shade val="50000"/>
+            </a:schemeClr>
+          </a:lnRef>
+          <a:fillRef idx="1">
+            <a:schemeClr val="accent1"/>
+          </a:fillRef>
+          <a:effectRef idx="0">
+            <a:schemeClr val="accent1"/>
+          </a:effectRef>
+          <a:fontRef idx="minor">
+            <a:schemeClr val="lt1"/>
+          </a:fontRef>
+        </p:style>
+        <p:txBody>
+          <a:bodyPr rtlCol="0" anchor="ctr"/>
+          <a:lstStyle/>
+          <a:p>
+            <a:pPr algn="ctr"/>
+            <a:r>
+              <a:rPr lang="en-US" dirty="0" smtClean="0">
+                <a:solidFill>
+                  <a:schemeClr val="tx1"/>
+                </a:solidFill>
+                <a:latin typeface="Franklin Gothic Demi Cond" panose="020B0706030402020204" pitchFamily="34" charset="0"/>
+              </a:rPr>
+              <a:t>1</a:t>
+            </a:r>
+            <a:endParaRPr lang="en-US" dirty="0">
+              <a:solidFill>
+                <a:schemeClr val="tx1"/>
+              </a:solidFill>
+              <a:latin typeface="Franklin Gothic Demi Cond" panose="020B0706030402020204" pitchFamily="34" charset="0"/>
+            </a:endParaRPr>
+          </a:p>
+        </p:txBody>
+      </p:sp>
+      <p:sp>
+        <p:nvSpPr>
+          <p:cNvPr id="4" name="Oval 3"/>
+          <p:cNvSpPr/>
+          <p:nvPr/>
+        </p:nvSpPr>
+        <p:spPr>
+          <a:xfrm>
+            <a:off x="4444798" y="2518467"/>
+            <a:ext cx="280087" cy="271849"/>
+          </a:xfrm>
+          <a:prstGeom prst="ellipse">
+            <a:avLst/>
+          </a:prstGeom>
+          <a:solidFill>
+            <a:srgbClr val="F5AB0C"/>
+          </a:solidFill>
+          <a:ln>
+            <a:solidFill>
+              <a:schemeClr val="tx1"/>
+            </a:solidFill>
+          </a:ln>
+        </p:spPr>
+        <p:style>
+          <a:lnRef idx="2">
+            <a:schemeClr val="accent1">
+              <a:shade val="50000"/>
+            </a:schemeClr>
+          </a:lnRef>
+          <a:fillRef idx="1">
+            <a:schemeClr val="accent1"/>
+          </a:fillRef>
+          <a:effectRef idx="0">
+            <a:schemeClr val="accent1"/>
+          </a:effectRef>
+          <a:fontRef idx="minor">
+            <a:schemeClr val="lt1"/>
+          </a:fontRef>
+        </p:style>
+        <p:txBody>
+          <a:bodyPr rtlCol="0" anchor="ctr"/>
+          <a:lstStyle/>
+          <a:p>
+            <a:pPr algn="ctr"/>
+            <a:r>
+              <a:rPr lang="en-US" dirty="0">
+                <a:solidFill>
+                  <a:schemeClr val="tx1"/>
+                </a:solidFill>
+                <a:latin typeface="Franklin Gothic Demi Cond" panose="020B0706030402020204" pitchFamily="34" charset="0"/>
+              </a:rPr>
+              <a:t>2</a:t>
+            </a:r>
+          </a:p>
+        </p:txBody>
+      </p:sp>
+      <p:sp>
+        <p:nvSpPr>
+          <p:cNvPr id="5" name="Oval 4"/>
+          <p:cNvSpPr/>
+          <p:nvPr/>
+        </p:nvSpPr>
+        <p:spPr>
+          <a:xfrm>
+            <a:off x="4724885" y="2790316"/>
+            <a:ext cx="280087" cy="271849"/>
+          </a:xfrm>
+          <a:prstGeom prst="ellipse">
+            <a:avLst/>
+          </a:prstGeom>
+          <a:solidFill>
+            <a:srgbClr val="F5AB0C"/>
+          </a:solidFill>
+          <a:ln>
+            <a:solidFill>
+              <a:schemeClr val="tx1"/>
+            </a:solidFill>
+          </a:ln>
+        </p:spPr>
+        <p:style>
+          <a:lnRef idx="2">
+            <a:schemeClr val="accent1">
+              <a:shade val="50000"/>
+            </a:schemeClr>
+          </a:lnRef>
+          <a:fillRef idx="1">
+            <a:schemeClr val="accent1"/>
+          </a:fillRef>
+          <a:effectRef idx="0">
+            <a:schemeClr val="accent1"/>
+          </a:effectRef>
+          <a:fontRef idx="minor">
+            <a:schemeClr val="lt1"/>
+          </a:fontRef>
+        </p:style>
+        <p:txBody>
+          <a:bodyPr rtlCol="0" anchor="ctr"/>
+          <a:lstStyle/>
+          <a:p>
+            <a:pPr algn="ctr"/>
+            <a:r>
+              <a:rPr lang="en-US" dirty="0">
+                <a:solidFill>
+                  <a:schemeClr val="tx1"/>
+                </a:solidFill>
+                <a:latin typeface="Franklin Gothic Demi Cond" panose="020B0706030402020204" pitchFamily="34" charset="0"/>
+              </a:rPr>
+              <a:t>3</a:t>
+            </a:r>
+          </a:p>
+        </p:txBody>
+      </p:sp>
+      <p:sp>
+        <p:nvSpPr>
+          <p:cNvPr id="6" name="Oval 5"/>
+          <p:cNvSpPr/>
+          <p:nvPr/>
+        </p:nvSpPr>
+        <p:spPr>
+          <a:xfrm>
+            <a:off x="6981294" y="2654391"/>
+            <a:ext cx="280087" cy="271849"/>
+          </a:xfrm>
+          <a:prstGeom prst="ellipse">
+            <a:avLst/>
+          </a:prstGeom>
+          <a:solidFill>
+            <a:srgbClr val="F5AB0C"/>
+          </a:solidFill>
+          <a:ln>
+            <a:solidFill>
+              <a:schemeClr val="tx1"/>
+            </a:solidFill>
+          </a:ln>
+        </p:spPr>
+        <p:style>
+          <a:lnRef idx="2">
+            <a:schemeClr val="accent1">
+              <a:shade val="50000"/>
+            </a:schemeClr>
+          </a:lnRef>
+          <a:fillRef idx="1">
+            <a:schemeClr val="accent1"/>
+          </a:fillRef>
+          <a:effectRef idx="0">
+            <a:schemeClr val="accent1"/>
+          </a:effectRef>
+          <a:fontRef idx="minor">
+            <a:schemeClr val="lt1"/>
+          </a:fontRef>
+        </p:style>
+        <p:txBody>
+          <a:bodyPr rtlCol="0" anchor="ctr"/>
+          <a:lstStyle/>
+          <a:p>
+            <a:pPr algn="ctr"/>
+            <a:r>
+              <a:rPr lang="en-US" dirty="0">
+                <a:solidFill>
+                  <a:schemeClr val="tx1"/>
+                </a:solidFill>
+                <a:latin typeface="Franklin Gothic Demi Cond" panose="020B0706030402020204" pitchFamily="34" charset="0"/>
+              </a:rPr>
+              <a:t>4</a:t>
+            </a:r>
+          </a:p>
+        </p:txBody>
+      </p:sp>
+      <p:sp>
+        <p:nvSpPr>
+          <p:cNvPr id="7" name="Oval 6"/>
+          <p:cNvSpPr/>
+          <p:nvPr/>
+        </p:nvSpPr>
+        <p:spPr>
+          <a:xfrm>
+            <a:off x="5887185" y="3157150"/>
+            <a:ext cx="280087" cy="271849"/>
+          </a:xfrm>
+          <a:prstGeom prst="ellipse">
+            <a:avLst/>
+          </a:prstGeom>
+          <a:solidFill>
+            <a:srgbClr val="F5AB0C"/>
+          </a:solidFill>
+          <a:ln>
+            <a:solidFill>
+              <a:schemeClr val="tx1"/>
+            </a:solidFill>
+          </a:ln>
+        </p:spPr>
+        <p:style>
+          <a:lnRef idx="2">
+            <a:schemeClr val="accent1">
+              <a:shade val="50000"/>
+            </a:schemeClr>
+          </a:lnRef>
+          <a:fillRef idx="1">
+            <a:schemeClr val="accent1"/>
+          </a:fillRef>
+          <a:effectRef idx="0">
+            <a:schemeClr val="accent1"/>
+          </a:effectRef>
+          <a:fontRef idx="minor">
+            <a:schemeClr val="lt1"/>
+          </a:fontRef>
+        </p:style>
+        <p:txBody>
+          <a:bodyPr rtlCol="0" anchor="ctr"/>
+          <a:lstStyle/>
+          <a:p>
+            <a:pPr algn="ctr"/>
+            <a:r>
+              <a:rPr lang="en-US" dirty="0">
+                <a:solidFill>
+                  <a:schemeClr val="tx1"/>
+                </a:solidFill>
+                <a:latin typeface="Franklin Gothic Demi Cond" panose="020B0706030402020204" pitchFamily="34" charset="0"/>
+              </a:rPr>
+              <a:t>5</a:t>
+            </a:r>
+          </a:p>
+        </p:txBody>
+      </p:sp>
+      <p:sp>
+        <p:nvSpPr>
+          <p:cNvPr id="8" name="Oval 7"/>
+          <p:cNvSpPr/>
+          <p:nvPr/>
+        </p:nvSpPr>
+        <p:spPr>
+          <a:xfrm>
+            <a:off x="4238853" y="3946248"/>
+            <a:ext cx="280087" cy="271849"/>
+          </a:xfrm>
+          <a:prstGeom prst="ellipse">
+            <a:avLst/>
+          </a:prstGeom>
+          <a:solidFill>
+            <a:srgbClr val="F5AB0C"/>
+          </a:solidFill>
+          <a:ln>
+            <a:solidFill>
+              <a:schemeClr val="tx1"/>
+            </a:solidFill>
+          </a:ln>
+        </p:spPr>
+        <p:style>
+          <a:lnRef idx="2">
+            <a:schemeClr val="accent1">
+              <a:shade val="50000"/>
+            </a:schemeClr>
+          </a:lnRef>
+          <a:fillRef idx="1">
+            <a:schemeClr val="accent1"/>
+          </a:fillRef>
+          <a:effectRef idx="0">
+            <a:schemeClr val="accent1"/>
+          </a:effectRef>
+          <a:fontRef idx="minor">
+            <a:schemeClr val="lt1"/>
+          </a:fontRef>
+        </p:style>
+        <p:txBody>
+          <a:bodyPr rtlCol="0" anchor="ctr"/>
+          <a:lstStyle/>
+          <a:p>
+            <a:pPr algn="ctr"/>
+            <a:r>
+              <a:rPr lang="en-US" dirty="0">
+                <a:solidFill>
+                  <a:schemeClr val="tx1"/>
+                </a:solidFill>
+                <a:latin typeface="Franklin Gothic Demi Cond" panose="020B0706030402020204" pitchFamily="34" charset="0"/>
+              </a:rPr>
+              <a:t>6</a:t>
+            </a:r>
+          </a:p>
+        </p:txBody>
+      </p:sp>
+      <p:sp>
+        <p:nvSpPr>
+          <p:cNvPr id="10" name="Oval 9"/>
+          <p:cNvSpPr/>
+          <p:nvPr/>
+        </p:nvSpPr>
+        <p:spPr>
+          <a:xfrm>
+            <a:off x="9918843" y="2458222"/>
+            <a:ext cx="280087" cy="271849"/>
+          </a:xfrm>
+          <a:prstGeom prst="ellipse">
+            <a:avLst/>
+          </a:prstGeom>
+          <a:solidFill>
+            <a:srgbClr val="F5AB0C"/>
+          </a:solidFill>
+          <a:ln>
+            <a:solidFill>
+              <a:schemeClr val="tx1"/>
+            </a:solidFill>
+          </a:ln>
+        </p:spPr>
+        <p:style>
+          <a:lnRef idx="2">
+            <a:schemeClr val="accent1">
+              <a:shade val="50000"/>
+            </a:schemeClr>
+          </a:lnRef>
+          <a:fillRef idx="1">
+            <a:schemeClr val="accent1"/>
+          </a:fillRef>
+          <a:effectRef idx="0">
+            <a:schemeClr val="accent1"/>
+          </a:effectRef>
+          <a:fontRef idx="minor">
+            <a:schemeClr val="lt1"/>
+          </a:fontRef>
+        </p:style>
+        <p:txBody>
+          <a:bodyPr rtlCol="0" anchor="ctr"/>
+          <a:lstStyle/>
+          <a:p>
+            <a:pPr algn="ctr"/>
+            <a:r>
+              <a:rPr lang="en-US" dirty="0">
+                <a:solidFill>
+                  <a:schemeClr val="tx1"/>
+                </a:solidFill>
+                <a:latin typeface="Franklin Gothic Demi Cond" panose="020B0706030402020204" pitchFamily="34" charset="0"/>
+              </a:rPr>
+              <a:t>7</a:t>
+            </a:r>
+            <a:endParaRPr lang="en-US" dirty="0">
+              <a:solidFill>
+                <a:schemeClr val="tx1"/>
+              </a:solidFill>
+              <a:latin typeface="Franklin Gothic Demi Cond" panose="020B0706030402020204" pitchFamily="34" charset="0"/>
+            </a:endParaRPr>
+          </a:p>
+        </p:txBody>
+      </p:sp>
+    </p:spTree>
+    <p:extLst>
+      <p:ext uri="{BB962C8B-B14F-4D97-AF65-F5344CB8AC3E}">
+        <p14:creationId xmlns:p14="http://schemas.microsoft.com/office/powerpoint/2010/main" val="2730074676"/>
+      </p:ext>
+    </p:extLst>
+  </p:cSld>
+  <p:clrMapOvr>
+    <a:masterClrMapping/>
+  </p:clrMapOvr>
+</p:sld>
+</file>
+
+<file path=ppt/slides/slide21.xml><?xml version="1.0" encoding="utf-8"?>
+<p:sld xmlns:a="http://schemas.openxmlformats.org/drawingml/2006/main" xmlns:r="http://schemas.openxmlformats.org/officeDocument/2006/relationships" xmlns:p="http://schemas.openxmlformats.org/presentationml/2006/main">
+  <p:cSld>
+    <p:spTree>
+      <p:nvGrpSpPr>
+        <p:cNvPr id="1" name=""/>
+        <p:cNvGrpSpPr/>
+        <p:nvPr/>
+      </p:nvGrpSpPr>
+      <p:grpSpPr>
+        <a:xfrm>
+          <a:off x="0" y="0"/>
+          <a:ext cx="0" cy="0"/>
+          <a:chOff x="0" y="0"/>
+          <a:chExt cx="0" cy="0"/>
+        </a:xfrm>
+      </p:grpSpPr>
+      <p:sp>
+        <p:nvSpPr>
+          <p:cNvPr id="3" name="Oval 2"/>
+          <p:cNvSpPr/>
+          <p:nvPr/>
+        </p:nvSpPr>
+        <p:spPr>
+          <a:xfrm>
+            <a:off x="5962641" y="1914525"/>
+            <a:ext cx="280087" cy="271849"/>
+          </a:xfrm>
+          <a:prstGeom prst="ellipse">
+            <a:avLst/>
+          </a:prstGeom>
+          <a:solidFill>
+            <a:srgbClr val="F5AB0C"/>
+          </a:solidFill>
+          <a:ln>
+            <a:solidFill>
+              <a:schemeClr val="tx1"/>
+            </a:solidFill>
+          </a:ln>
+        </p:spPr>
+        <p:style>
+          <a:lnRef idx="2">
+            <a:schemeClr val="accent1">
+              <a:shade val="50000"/>
+            </a:schemeClr>
+          </a:lnRef>
+          <a:fillRef idx="1">
+            <a:schemeClr val="accent1"/>
+          </a:fillRef>
+          <a:effectRef idx="0">
+            <a:schemeClr val="accent1"/>
+          </a:effectRef>
+          <a:fontRef idx="minor">
+            <a:schemeClr val="lt1"/>
+          </a:fontRef>
+        </p:style>
+        <p:txBody>
+          <a:bodyPr rtlCol="0" anchor="ctr"/>
+          <a:lstStyle/>
+          <a:p>
+            <a:pPr algn="ctr"/>
+            <a:r>
+              <a:rPr lang="en-US" dirty="0" smtClean="0">
+                <a:solidFill>
+                  <a:schemeClr val="tx1"/>
+                </a:solidFill>
+                <a:latin typeface="Franklin Gothic Demi Cond" panose="020B0706030402020204" pitchFamily="34" charset="0"/>
+              </a:rPr>
+              <a:t>1</a:t>
+            </a:r>
+            <a:endParaRPr lang="en-US" dirty="0">
+              <a:solidFill>
+                <a:schemeClr val="tx1"/>
+              </a:solidFill>
+              <a:latin typeface="Franklin Gothic Demi Cond" panose="020B0706030402020204" pitchFamily="34" charset="0"/>
+            </a:endParaRPr>
+          </a:p>
+        </p:txBody>
+      </p:sp>
+      <p:sp>
+        <p:nvSpPr>
+          <p:cNvPr id="4" name="Oval 3"/>
+          <p:cNvSpPr/>
+          <p:nvPr/>
+        </p:nvSpPr>
+        <p:spPr>
+          <a:xfrm>
+            <a:off x="6578399" y="2050449"/>
+            <a:ext cx="280087" cy="271849"/>
+          </a:xfrm>
+          <a:prstGeom prst="ellipse">
+            <a:avLst/>
+          </a:prstGeom>
+          <a:solidFill>
+            <a:srgbClr val="F5AB0C"/>
+          </a:solidFill>
+          <a:ln>
+            <a:solidFill>
+              <a:schemeClr val="tx1"/>
+            </a:solidFill>
+          </a:ln>
+        </p:spPr>
+        <p:style>
+          <a:lnRef idx="2">
+            <a:schemeClr val="accent1">
+              <a:shade val="50000"/>
+            </a:schemeClr>
+          </a:lnRef>
+          <a:fillRef idx="1">
+            <a:schemeClr val="accent1"/>
+          </a:fillRef>
+          <a:effectRef idx="0">
+            <a:schemeClr val="accent1"/>
+          </a:effectRef>
+          <a:fontRef idx="minor">
+            <a:schemeClr val="lt1"/>
+          </a:fontRef>
+        </p:style>
+        <p:txBody>
+          <a:bodyPr rtlCol="0" anchor="ctr"/>
+          <a:lstStyle/>
+          <a:p>
+            <a:pPr algn="ctr"/>
+            <a:r>
+              <a:rPr lang="en-US" dirty="0">
+                <a:solidFill>
+                  <a:schemeClr val="tx1"/>
+                </a:solidFill>
+                <a:latin typeface="Franklin Gothic Demi Cond" panose="020B0706030402020204" pitchFamily="34" charset="0"/>
+              </a:rPr>
+              <a:t>2</a:t>
+            </a:r>
+          </a:p>
+        </p:txBody>
+      </p:sp>
+      <p:sp>
+        <p:nvSpPr>
+          <p:cNvPr id="5" name="Oval 4"/>
+          <p:cNvSpPr/>
+          <p:nvPr/>
+        </p:nvSpPr>
+        <p:spPr>
+          <a:xfrm>
+            <a:off x="5815913" y="2352421"/>
+            <a:ext cx="280087" cy="271849"/>
+          </a:xfrm>
+          <a:prstGeom prst="ellipse">
+            <a:avLst/>
+          </a:prstGeom>
+          <a:solidFill>
+            <a:srgbClr val="F5AB0C"/>
+          </a:solidFill>
+          <a:ln>
+            <a:solidFill>
+              <a:schemeClr val="tx1"/>
+            </a:solidFill>
+          </a:ln>
+        </p:spPr>
+        <p:style>
+          <a:lnRef idx="2">
+            <a:schemeClr val="accent1">
+              <a:shade val="50000"/>
+            </a:schemeClr>
+          </a:lnRef>
+          <a:fillRef idx="1">
+            <a:schemeClr val="accent1"/>
+          </a:fillRef>
+          <a:effectRef idx="0">
+            <a:schemeClr val="accent1"/>
+          </a:effectRef>
+          <a:fontRef idx="minor">
+            <a:schemeClr val="lt1"/>
+          </a:fontRef>
+        </p:style>
+        <p:txBody>
+          <a:bodyPr rtlCol="0" anchor="ctr"/>
+          <a:lstStyle/>
+          <a:p>
+            <a:pPr algn="ctr"/>
+            <a:r>
+              <a:rPr lang="en-US" dirty="0">
+                <a:solidFill>
+                  <a:schemeClr val="tx1"/>
+                </a:solidFill>
+                <a:latin typeface="Franklin Gothic Demi Cond" panose="020B0706030402020204" pitchFamily="34" charset="0"/>
+              </a:rPr>
+              <a:t>3</a:t>
+            </a:r>
+          </a:p>
+        </p:txBody>
+      </p:sp>
+      <p:sp>
+        <p:nvSpPr>
+          <p:cNvPr id="6" name="Oval 5"/>
+          <p:cNvSpPr/>
+          <p:nvPr/>
+        </p:nvSpPr>
+        <p:spPr>
+          <a:xfrm>
+            <a:off x="5854247" y="2654392"/>
+            <a:ext cx="280087" cy="271849"/>
+          </a:xfrm>
+          <a:prstGeom prst="ellipse">
+            <a:avLst/>
+          </a:prstGeom>
+          <a:solidFill>
+            <a:srgbClr val="F5AB0C"/>
+          </a:solidFill>
+          <a:ln>
+            <a:solidFill>
+              <a:schemeClr val="tx1"/>
+            </a:solidFill>
+          </a:ln>
+        </p:spPr>
+        <p:style>
+          <a:lnRef idx="2">
+            <a:schemeClr val="accent1">
+              <a:shade val="50000"/>
+            </a:schemeClr>
+          </a:lnRef>
+          <a:fillRef idx="1">
+            <a:schemeClr val="accent1"/>
+          </a:fillRef>
+          <a:effectRef idx="0">
+            <a:schemeClr val="accent1"/>
+          </a:effectRef>
+          <a:fontRef idx="minor">
+            <a:schemeClr val="lt1"/>
+          </a:fontRef>
+        </p:style>
+        <p:txBody>
+          <a:bodyPr rtlCol="0" anchor="ctr"/>
+          <a:lstStyle/>
+          <a:p>
+            <a:pPr algn="ctr"/>
+            <a:r>
+              <a:rPr lang="en-US" dirty="0">
+                <a:solidFill>
+                  <a:schemeClr val="tx1"/>
+                </a:solidFill>
+                <a:latin typeface="Franklin Gothic Demi Cond" panose="020B0706030402020204" pitchFamily="34" charset="0"/>
+              </a:rPr>
+              <a:t>4</a:t>
+            </a:r>
+          </a:p>
+        </p:txBody>
+      </p:sp>
+      <p:sp>
+        <p:nvSpPr>
+          <p:cNvPr id="7" name="Oval 6"/>
+          <p:cNvSpPr/>
+          <p:nvPr/>
+        </p:nvSpPr>
+        <p:spPr>
+          <a:xfrm>
+            <a:off x="5648288" y="3304664"/>
+            <a:ext cx="280087" cy="271849"/>
+          </a:xfrm>
+          <a:prstGeom prst="ellipse">
+            <a:avLst/>
+          </a:prstGeom>
+          <a:solidFill>
+            <a:srgbClr val="F5AB0C"/>
+          </a:solidFill>
+          <a:ln>
+            <a:solidFill>
+              <a:schemeClr val="tx1"/>
+            </a:solidFill>
+          </a:ln>
+        </p:spPr>
+        <p:style>
+          <a:lnRef idx="2">
+            <a:schemeClr val="accent1">
+              <a:shade val="50000"/>
+            </a:schemeClr>
+          </a:lnRef>
+          <a:fillRef idx="1">
+            <a:schemeClr val="accent1"/>
+          </a:fillRef>
+          <a:effectRef idx="0">
+            <a:schemeClr val="accent1"/>
+          </a:effectRef>
+          <a:fontRef idx="minor">
+            <a:schemeClr val="lt1"/>
+          </a:fontRef>
+        </p:style>
+        <p:txBody>
+          <a:bodyPr rtlCol="0" anchor="ctr"/>
+          <a:lstStyle/>
+          <a:p>
+            <a:pPr algn="ctr"/>
+            <a:r>
+              <a:rPr lang="en-US" dirty="0">
+                <a:solidFill>
+                  <a:schemeClr val="tx1"/>
+                </a:solidFill>
+                <a:latin typeface="Franklin Gothic Demi Cond" panose="020B0706030402020204" pitchFamily="34" charset="0"/>
+              </a:rPr>
+              <a:t>5</a:t>
+            </a:r>
+          </a:p>
+        </p:txBody>
+      </p:sp>
+      <p:sp>
+        <p:nvSpPr>
+          <p:cNvPr id="8" name="Oval 7"/>
+          <p:cNvSpPr/>
+          <p:nvPr/>
+        </p:nvSpPr>
+        <p:spPr>
+          <a:xfrm>
+            <a:off x="6298312" y="3361037"/>
+            <a:ext cx="280087" cy="271849"/>
+          </a:xfrm>
+          <a:prstGeom prst="ellipse">
+            <a:avLst/>
+          </a:prstGeom>
+          <a:solidFill>
+            <a:srgbClr val="F5AB0C"/>
+          </a:solidFill>
+          <a:ln>
+            <a:solidFill>
+              <a:schemeClr val="tx1"/>
+            </a:solidFill>
+          </a:ln>
+        </p:spPr>
+        <p:style>
+          <a:lnRef idx="2">
+            <a:schemeClr val="accent1">
+              <a:shade val="50000"/>
+            </a:schemeClr>
+          </a:lnRef>
+          <a:fillRef idx="1">
+            <a:schemeClr val="accent1"/>
+          </a:fillRef>
+          <a:effectRef idx="0">
+            <a:schemeClr val="accent1"/>
+          </a:effectRef>
+          <a:fontRef idx="minor">
+            <a:schemeClr val="lt1"/>
+          </a:fontRef>
+        </p:style>
+        <p:txBody>
+          <a:bodyPr rtlCol="0" anchor="ctr"/>
+          <a:lstStyle/>
+          <a:p>
+            <a:pPr algn="ctr"/>
+            <a:r>
+              <a:rPr lang="en-US" dirty="0">
+                <a:solidFill>
+                  <a:schemeClr val="tx1"/>
+                </a:solidFill>
+                <a:latin typeface="Franklin Gothic Demi Cond" panose="020B0706030402020204" pitchFamily="34" charset="0"/>
+              </a:rPr>
+              <a:t>6</a:t>
+            </a:r>
+          </a:p>
+        </p:txBody>
+      </p:sp>
+    </p:spTree>
+    <p:extLst>
+      <p:ext uri="{BB962C8B-B14F-4D97-AF65-F5344CB8AC3E}">
+        <p14:creationId xmlns:p14="http://schemas.microsoft.com/office/powerpoint/2010/main" val="3598429855"/>
       </p:ext>
     </p:extLst>
   </p:cSld>

</xml_diff>

<commit_message>
More on How it works doc
</commit_message>
<xml_diff>
--- a/docsProject/IntentUserManualImages.pptx
+++ b/docsProject/IntentUserManualImages.pptx
@@ -26,6 +26,9 @@
     <p:sldId id="274" r:id="rId20"/>
     <p:sldId id="275" r:id="rId21"/>
     <p:sldId id="276" r:id="rId22"/>
+    <p:sldId id="277" r:id="rId23"/>
+    <p:sldId id="278" r:id="rId24"/>
+    <p:sldId id="279" r:id="rId25"/>
   </p:sldIdLst>
   <p:sldSz cx="12192000" cy="6858000"/>
   <p:notesSz cx="6858000" cy="9144000"/>
@@ -263,7 +266,7 @@
           <a:p>
             <a:fld id="{1461CAAB-CD95-4EF5-8A41-73166CBFBDC9}" type="datetimeFigureOut">
               <a:rPr lang="en-US" smtClean="0"/>
-              <a:t>9/19/2017</a:t>
+              <a:t>10/2/2017</a:t>
             </a:fld>
             <a:endParaRPr lang="en-US"/>
           </a:p>
@@ -433,7 +436,7 @@
           <a:p>
             <a:fld id="{1461CAAB-CD95-4EF5-8A41-73166CBFBDC9}" type="datetimeFigureOut">
               <a:rPr lang="en-US" smtClean="0"/>
-              <a:t>9/19/2017</a:t>
+              <a:t>10/2/2017</a:t>
             </a:fld>
             <a:endParaRPr lang="en-US"/>
           </a:p>
@@ -613,7 +616,7 @@
           <a:p>
             <a:fld id="{1461CAAB-CD95-4EF5-8A41-73166CBFBDC9}" type="datetimeFigureOut">
               <a:rPr lang="en-US" smtClean="0"/>
-              <a:t>9/19/2017</a:t>
+              <a:t>10/2/2017</a:t>
             </a:fld>
             <a:endParaRPr lang="en-US"/>
           </a:p>
@@ -783,7 +786,7 @@
           <a:p>
             <a:fld id="{1461CAAB-CD95-4EF5-8A41-73166CBFBDC9}" type="datetimeFigureOut">
               <a:rPr lang="en-US" smtClean="0"/>
-              <a:t>9/19/2017</a:t>
+              <a:t>10/2/2017</a:t>
             </a:fld>
             <a:endParaRPr lang="en-US"/>
           </a:p>
@@ -1029,7 +1032,7 @@
           <a:p>
             <a:fld id="{1461CAAB-CD95-4EF5-8A41-73166CBFBDC9}" type="datetimeFigureOut">
               <a:rPr lang="en-US" smtClean="0"/>
-              <a:t>9/19/2017</a:t>
+              <a:t>10/2/2017</a:t>
             </a:fld>
             <a:endParaRPr lang="en-US"/>
           </a:p>
@@ -1261,7 +1264,7 @@
           <a:p>
             <a:fld id="{1461CAAB-CD95-4EF5-8A41-73166CBFBDC9}" type="datetimeFigureOut">
               <a:rPr lang="en-US" smtClean="0"/>
-              <a:t>9/19/2017</a:t>
+              <a:t>10/2/2017</a:t>
             </a:fld>
             <a:endParaRPr lang="en-US"/>
           </a:p>
@@ -1628,7 +1631,7 @@
           <a:p>
             <a:fld id="{1461CAAB-CD95-4EF5-8A41-73166CBFBDC9}" type="datetimeFigureOut">
               <a:rPr lang="en-US" smtClean="0"/>
-              <a:t>9/19/2017</a:t>
+              <a:t>10/2/2017</a:t>
             </a:fld>
             <a:endParaRPr lang="en-US"/>
           </a:p>
@@ -1746,7 +1749,7 @@
           <a:p>
             <a:fld id="{1461CAAB-CD95-4EF5-8A41-73166CBFBDC9}" type="datetimeFigureOut">
               <a:rPr lang="en-US" smtClean="0"/>
-              <a:t>9/19/2017</a:t>
+              <a:t>10/2/2017</a:t>
             </a:fld>
             <a:endParaRPr lang="en-US"/>
           </a:p>
@@ -1841,7 +1844,7 @@
           <a:p>
             <a:fld id="{1461CAAB-CD95-4EF5-8A41-73166CBFBDC9}" type="datetimeFigureOut">
               <a:rPr lang="en-US" smtClean="0"/>
-              <a:t>9/19/2017</a:t>
+              <a:t>10/2/2017</a:t>
             </a:fld>
             <a:endParaRPr lang="en-US"/>
           </a:p>
@@ -2118,7 +2121,7 @@
           <a:p>
             <a:fld id="{1461CAAB-CD95-4EF5-8A41-73166CBFBDC9}" type="datetimeFigureOut">
               <a:rPr lang="en-US" smtClean="0"/>
-              <a:t>9/19/2017</a:t>
+              <a:t>10/2/2017</a:t>
             </a:fld>
             <a:endParaRPr lang="en-US"/>
           </a:p>
@@ -2371,7 +2374,7 @@
           <a:p>
             <a:fld id="{1461CAAB-CD95-4EF5-8A41-73166CBFBDC9}" type="datetimeFigureOut">
               <a:rPr lang="en-US" smtClean="0"/>
-              <a:t>9/19/2017</a:t>
+              <a:t>10/2/2017</a:t>
             </a:fld>
             <a:endParaRPr lang="en-US"/>
           </a:p>
@@ -2584,7 +2587,7 @@
           <a:p>
             <a:fld id="{1461CAAB-CD95-4EF5-8A41-73166CBFBDC9}" type="datetimeFigureOut">
               <a:rPr lang="en-US" smtClean="0"/>
-              <a:t>9/19/2017</a:t>
+              <a:t>10/2/2017</a:t>
             </a:fld>
             <a:endParaRPr lang="en-US"/>
           </a:p>
@@ -7446,12 +7449,6 @@
               </a:rPr>
               <a:t>7</a:t>
             </a:r>
-            <a:endParaRPr lang="en-US" dirty="0">
-              <a:solidFill>
-                <a:schemeClr val="tx1"/>
-              </a:solidFill>
-              <a:latin typeface="Franklin Gothic Demi Cond" panose="020B0706030402020204" pitchFamily="34" charset="0"/>
-            </a:endParaRPr>
           </a:p>
         </p:txBody>
       </p:sp>
@@ -7831,6 +7828,168 @@
     <p:extLst>
       <p:ext uri="{BB962C8B-B14F-4D97-AF65-F5344CB8AC3E}">
         <p14:creationId xmlns:p14="http://schemas.microsoft.com/office/powerpoint/2010/main" val="3598429855"/>
+      </p:ext>
+    </p:extLst>
+  </p:cSld>
+  <p:clrMapOvr>
+    <a:masterClrMapping/>
+  </p:clrMapOvr>
+</p:sld>
+</file>
+
+<file path=ppt/slides/slide22.xml><?xml version="1.0" encoding="utf-8"?>
+<p:sld xmlns:a="http://schemas.openxmlformats.org/drawingml/2006/main" xmlns:r="http://schemas.openxmlformats.org/officeDocument/2006/relationships" xmlns:p="http://schemas.openxmlformats.org/presentationml/2006/main">
+  <p:cSld>
+    <p:spTree>
+      <p:nvGrpSpPr>
+        <p:cNvPr id="1" name=""/>
+        <p:cNvGrpSpPr/>
+        <p:nvPr/>
+      </p:nvGrpSpPr>
+      <p:grpSpPr>
+        <a:xfrm>
+          <a:off x="0" y="0"/>
+          <a:ext cx="0" cy="0"/>
+          <a:chOff x="0" y="0"/>
+          <a:chExt cx="0" cy="0"/>
+        </a:xfrm>
+      </p:grpSpPr>
+      <p:pic>
+        <p:nvPicPr>
+          <p:cNvPr id="5" name="Picture 4"/>
+          <p:cNvPicPr>
+            <a:picLocks noChangeAspect="1"/>
+          </p:cNvPicPr>
+          <p:nvPr/>
+        </p:nvPicPr>
+        <p:blipFill>
+          <a:blip r:embed="rId2"/>
+          <a:stretch>
+            <a:fillRect/>
+          </a:stretch>
+        </p:blipFill>
+        <p:spPr>
+          <a:xfrm>
+            <a:off x="1566862" y="1162050"/>
+            <a:ext cx="9058275" cy="4533900"/>
+          </a:xfrm>
+          <a:prstGeom prst="rect">
+            <a:avLst/>
+          </a:prstGeom>
+        </p:spPr>
+      </p:pic>
+    </p:spTree>
+    <p:extLst>
+      <p:ext uri="{BB962C8B-B14F-4D97-AF65-F5344CB8AC3E}">
+        <p14:creationId xmlns:p14="http://schemas.microsoft.com/office/powerpoint/2010/main" val="3036534668"/>
+      </p:ext>
+    </p:extLst>
+  </p:cSld>
+  <p:clrMapOvr>
+    <a:masterClrMapping/>
+  </p:clrMapOvr>
+</p:sld>
+</file>
+
+<file path=ppt/slides/slide23.xml><?xml version="1.0" encoding="utf-8"?>
+<p:sld xmlns:a="http://schemas.openxmlformats.org/drawingml/2006/main" xmlns:r="http://schemas.openxmlformats.org/officeDocument/2006/relationships" xmlns:p="http://schemas.openxmlformats.org/presentationml/2006/main">
+  <p:cSld>
+    <p:spTree>
+      <p:nvGrpSpPr>
+        <p:cNvPr id="1" name=""/>
+        <p:cNvGrpSpPr/>
+        <p:nvPr/>
+      </p:nvGrpSpPr>
+      <p:grpSpPr>
+        <a:xfrm>
+          <a:off x="0" y="0"/>
+          <a:ext cx="0" cy="0"/>
+          <a:chOff x="0" y="0"/>
+          <a:chExt cx="0" cy="0"/>
+        </a:xfrm>
+      </p:grpSpPr>
+      <p:pic>
+        <p:nvPicPr>
+          <p:cNvPr id="4" name="Picture 3"/>
+          <p:cNvPicPr>
+            <a:picLocks noChangeAspect="1"/>
+          </p:cNvPicPr>
+          <p:nvPr/>
+        </p:nvPicPr>
+        <p:blipFill>
+          <a:blip r:embed="rId2"/>
+          <a:stretch>
+            <a:fillRect/>
+          </a:stretch>
+        </p:blipFill>
+        <p:spPr>
+          <a:xfrm>
+            <a:off x="1319212" y="395287"/>
+            <a:ext cx="9553575" cy="6067425"/>
+          </a:xfrm>
+          <a:prstGeom prst="rect">
+            <a:avLst/>
+          </a:prstGeom>
+        </p:spPr>
+      </p:pic>
+    </p:spTree>
+    <p:extLst>
+      <p:ext uri="{BB962C8B-B14F-4D97-AF65-F5344CB8AC3E}">
+        <p14:creationId xmlns:p14="http://schemas.microsoft.com/office/powerpoint/2010/main" val="4198413983"/>
+      </p:ext>
+    </p:extLst>
+  </p:cSld>
+  <p:clrMapOvr>
+    <a:masterClrMapping/>
+  </p:clrMapOvr>
+</p:sld>
+</file>
+
+<file path=ppt/slides/slide24.xml><?xml version="1.0" encoding="utf-8"?>
+<p:sld xmlns:a="http://schemas.openxmlformats.org/drawingml/2006/main" xmlns:r="http://schemas.openxmlformats.org/officeDocument/2006/relationships" xmlns:p="http://schemas.openxmlformats.org/presentationml/2006/main">
+  <p:cSld>
+    <p:spTree>
+      <p:nvGrpSpPr>
+        <p:cNvPr id="1" name=""/>
+        <p:cNvGrpSpPr/>
+        <p:nvPr/>
+      </p:nvGrpSpPr>
+      <p:grpSpPr>
+        <a:xfrm>
+          <a:off x="0" y="0"/>
+          <a:ext cx="0" cy="0"/>
+          <a:chOff x="0" y="0"/>
+          <a:chExt cx="0" cy="0"/>
+        </a:xfrm>
+      </p:grpSpPr>
+      <p:pic>
+        <p:nvPicPr>
+          <p:cNvPr id="4" name="Picture 3"/>
+          <p:cNvPicPr>
+            <a:picLocks noChangeAspect="1"/>
+          </p:cNvPicPr>
+          <p:nvPr/>
+        </p:nvPicPr>
+        <p:blipFill>
+          <a:blip r:embed="rId2"/>
+          <a:stretch>
+            <a:fillRect/>
+          </a:stretch>
+        </p:blipFill>
+        <p:spPr>
+          <a:xfrm>
+            <a:off x="1101105" y="0"/>
+            <a:ext cx="9989790" cy="6858000"/>
+          </a:xfrm>
+          <a:prstGeom prst="rect">
+            <a:avLst/>
+          </a:prstGeom>
+        </p:spPr>
+      </p:pic>
+    </p:spTree>
+    <p:extLst>
+      <p:ext uri="{BB962C8B-B14F-4D97-AF65-F5344CB8AC3E}">
+        <p14:creationId xmlns:p14="http://schemas.microsoft.com/office/powerpoint/2010/main" val="4039069860"/>
       </p:ext>
     </p:extLst>
   </p:cSld>

</xml_diff>